<commit_message>
update ayaan ku sameeyey
</commit_message>
<xml_diff>
--- a/Fududeeye(PPT).pptx
+++ b/Fududeeye(PPT).pptx
@@ -6,16 +6,18 @@
   </p:sldMasterIdLst>
   <p:sldIdLst>
     <p:sldId id="256" r:id="rId2"/>
-    <p:sldId id="257" r:id="rId3"/>
-    <p:sldId id="258" r:id="rId4"/>
-    <p:sldId id="259" r:id="rId5"/>
-    <p:sldId id="260" r:id="rId6"/>
-    <p:sldId id="261" r:id="rId7"/>
-    <p:sldId id="262" r:id="rId8"/>
-    <p:sldId id="263" r:id="rId9"/>
-    <p:sldId id="264" r:id="rId10"/>
-    <p:sldId id="265" r:id="rId11"/>
-    <p:sldId id="266" r:id="rId12"/>
+    <p:sldId id="259" r:id="rId3"/>
+    <p:sldId id="257" r:id="rId4"/>
+    <p:sldId id="258" r:id="rId5"/>
+    <p:sldId id="272" r:id="rId6"/>
+    <p:sldId id="273" r:id="rId7"/>
+    <p:sldId id="271" r:id="rId8"/>
+    <p:sldId id="261" r:id="rId9"/>
+    <p:sldId id="267" r:id="rId10"/>
+    <p:sldId id="268" r:id="rId11"/>
+    <p:sldId id="269" r:id="rId12"/>
+    <p:sldId id="270" r:id="rId13"/>
+    <p:sldId id="263" r:id="rId14"/>
   </p:sldIdLst>
   <p:sldSz cx="9144000" cy="6858000" type="screen4x3"/>
   <p:notesSz cx="6858000" cy="9144000"/>
@@ -312,7 +314,7 @@
           <a:p>
             <a:fld id="{5BCAD085-E8A6-8845-BD4E-CB4CCA059FC4}" type="datetimeFigureOut">
               <a:rPr lang="en-US" smtClean="0"/>
-              <a:t>12/22/2025</a:t>
+              <a:t>1/2/2026</a:t>
             </a:fld>
             <a:endParaRPr lang="en-US"/>
           </a:p>
@@ -480,7 +482,7 @@
           <a:p>
             <a:fld id="{5BCAD085-E8A6-8845-BD4E-CB4CCA059FC4}" type="datetimeFigureOut">
               <a:rPr lang="en-US" smtClean="0"/>
-              <a:t>12/22/2025</a:t>
+              <a:t>1/2/2026</a:t>
             </a:fld>
             <a:endParaRPr lang="en-US"/>
           </a:p>
@@ -658,7 +660,7 @@
           <a:p>
             <a:fld id="{5BCAD085-E8A6-8845-BD4E-CB4CCA059FC4}" type="datetimeFigureOut">
               <a:rPr lang="en-US" smtClean="0"/>
-              <a:t>12/22/2025</a:t>
+              <a:t>1/2/2026</a:t>
             </a:fld>
             <a:endParaRPr lang="en-US"/>
           </a:p>
@@ -826,7 +828,7 @@
           <a:p>
             <a:fld id="{5BCAD085-E8A6-8845-BD4E-CB4CCA059FC4}" type="datetimeFigureOut">
               <a:rPr lang="en-US" smtClean="0"/>
-              <a:t>12/22/2025</a:t>
+              <a:t>1/2/2026</a:t>
             </a:fld>
             <a:endParaRPr lang="en-US"/>
           </a:p>
@@ -1071,7 +1073,7 @@
           <a:p>
             <a:fld id="{5BCAD085-E8A6-8845-BD4E-CB4CCA059FC4}" type="datetimeFigureOut">
               <a:rPr lang="en-US" smtClean="0"/>
-              <a:t>12/22/2025</a:t>
+              <a:t>1/2/2026</a:t>
             </a:fld>
             <a:endParaRPr lang="en-US"/>
           </a:p>
@@ -1356,7 +1358,7 @@
           <a:p>
             <a:fld id="{5BCAD085-E8A6-8845-BD4E-CB4CCA059FC4}" type="datetimeFigureOut">
               <a:rPr lang="en-US" smtClean="0"/>
-              <a:t>12/22/2025</a:t>
+              <a:t>1/2/2026</a:t>
             </a:fld>
             <a:endParaRPr lang="en-US"/>
           </a:p>
@@ -1775,7 +1777,7 @@
           <a:p>
             <a:fld id="{5BCAD085-E8A6-8845-BD4E-CB4CCA059FC4}" type="datetimeFigureOut">
               <a:rPr lang="en-US" smtClean="0"/>
-              <a:t>12/22/2025</a:t>
+              <a:t>1/2/2026</a:t>
             </a:fld>
             <a:endParaRPr lang="en-US"/>
           </a:p>
@@ -1892,7 +1894,7 @@
           <a:p>
             <a:fld id="{5BCAD085-E8A6-8845-BD4E-CB4CCA059FC4}" type="datetimeFigureOut">
               <a:rPr lang="en-US" smtClean="0"/>
-              <a:t>12/22/2025</a:t>
+              <a:t>1/2/2026</a:t>
             </a:fld>
             <a:endParaRPr lang="en-US"/>
           </a:p>
@@ -1987,7 +1989,7 @@
           <a:p>
             <a:fld id="{5BCAD085-E8A6-8845-BD4E-CB4CCA059FC4}" type="datetimeFigureOut">
               <a:rPr lang="en-US" smtClean="0"/>
-              <a:t>12/22/2025</a:t>
+              <a:t>1/2/2026</a:t>
             </a:fld>
             <a:endParaRPr lang="en-US"/>
           </a:p>
@@ -2262,7 +2264,7 @@
           <a:p>
             <a:fld id="{5BCAD085-E8A6-8845-BD4E-CB4CCA059FC4}" type="datetimeFigureOut">
               <a:rPr lang="en-US" smtClean="0"/>
-              <a:t>12/22/2025</a:t>
+              <a:t>1/2/2026</a:t>
             </a:fld>
             <a:endParaRPr lang="en-US"/>
           </a:p>
@@ -2514,7 +2516,7 @@
           <a:p>
             <a:fld id="{5BCAD085-E8A6-8845-BD4E-CB4CCA059FC4}" type="datetimeFigureOut">
               <a:rPr lang="en-US" smtClean="0"/>
-              <a:t>12/22/2025</a:t>
+              <a:t>1/2/2026</a:t>
             </a:fld>
             <a:endParaRPr lang="en-US"/>
           </a:p>
@@ -2725,7 +2727,7 @@
           <a:p>
             <a:fld id="{5BCAD085-E8A6-8845-BD4E-CB4CCA059FC4}" type="datetimeFigureOut">
               <a:rPr lang="en-US" smtClean="0"/>
-              <a:t>12/22/2025</a:t>
+              <a:t>1/2/2026</a:t>
             </a:fld>
             <a:endParaRPr lang="en-US"/>
           </a:p>
@@ -3112,27 +3114,28 @@
         </p:nvSpPr>
         <p:spPr>
           <a:xfrm>
-            <a:off x="783771" y="1651454"/>
-            <a:ext cx="7772400" cy="1470025"/>
-          </a:xfrm>
-        </p:spPr>
-        <p:txBody>
-          <a:bodyPr/>
-          <a:lstStyle/>
-          <a:p>
-            <a:r>
-              <a:rPr dirty="0"/>
-              <a:t>Hospital Management System </a:t>
-            </a:r>
-            <a:r>
-              <a:rPr lang="en-US" dirty="0" err="1"/>
+            <a:off x="511629" y="2481233"/>
+            <a:ext cx="3603172" cy="461666"/>
+          </a:xfrm>
+        </p:spPr>
+        <p:txBody>
+          <a:bodyPr>
+            <a:normAutofit fontScale="90000"/>
+          </a:bodyPr>
+          <a:lstStyle/>
+          <a:p>
+            <a:r>
+              <a:rPr lang="en-US" sz="2000" b="1" dirty="0" err="1"/>
               <a:t>Fududeeye</a:t>
             </a:r>
             <a:r>
-              <a:rPr lang="en-US" dirty="0"/>
-              <a:t>-System</a:t>
-            </a:r>
-            <a:endParaRPr dirty="0"/>
+              <a:rPr lang="en-US" sz="2000" b="1" dirty="0"/>
+              <a:t> </a:t>
+            </a:r>
+            <a:r>
+              <a:rPr sz="2000" b="1" dirty="0"/>
+              <a:t>Management System</a:t>
+            </a:r>
           </a:p>
         </p:txBody>
       </p:sp>
@@ -3148,7 +3151,7 @@
         </p:nvSpPr>
         <p:spPr>
           <a:xfrm>
-            <a:off x="1230086" y="3320142"/>
+            <a:off x="674914" y="3126864"/>
             <a:ext cx="6400800" cy="1752600"/>
           </a:xfrm>
         </p:spPr>
@@ -3158,47 +3161,33 @@
           </a:bodyPr>
           <a:lstStyle/>
           <a:p>
+            <a:pPr algn="l"/>
             <a:r>
               <a:rPr sz="2000" b="1" dirty="0">
                 <a:solidFill>
-                  <a:srgbClr val="FF0000"/>
-                </a:solidFill>
-              </a:rPr>
-              <a:t>Global Science University (GSU)</a:t>
-            </a:r>
-          </a:p>
-          <a:p>
-            <a:endParaRPr sz="2000" b="1" dirty="0">
-              <a:solidFill>
-                <a:srgbClr val="FF0000"/>
-              </a:solidFill>
-            </a:endParaRPr>
-          </a:p>
-          <a:p>
-            <a:r>
-              <a:rPr sz="2000" b="1" dirty="0">
-                <a:solidFill>
-                  <a:srgbClr val="FF0000"/>
+                  <a:schemeClr val="tx1"/>
                 </a:solidFill>
               </a:rPr>
               <a:t>Prepared By:</a:t>
             </a:r>
           </a:p>
           <a:p>
+            <a:pPr algn="l"/>
             <a:r>
               <a:rPr sz="2000" b="1" dirty="0">
                 <a:solidFill>
-                  <a:srgbClr val="FF0000"/>
+                  <a:schemeClr val="tx1"/>
                 </a:solidFill>
               </a:rPr>
               <a:t>• Abdiqani Maxamed Cabdi</a:t>
             </a:r>
           </a:p>
           <a:p>
+            <a:pPr algn="l"/>
             <a:r>
               <a:rPr sz="2000" b="1" dirty="0">
                 <a:solidFill>
-                  <a:srgbClr val="FF0000"/>
+                  <a:schemeClr val="tx1"/>
                 </a:solidFill>
               </a:rPr>
               <a:t>• Abshir </a:t>
@@ -3206,42 +3195,61 @@
             <a:r>
               <a:rPr sz="2000" b="1" dirty="0" err="1">
                 <a:solidFill>
-                  <a:srgbClr val="FF0000"/>
+                  <a:schemeClr val="tx1"/>
                 </a:solidFill>
               </a:rPr>
               <a:t>Shaani</a:t>
             </a:r>
             <a:endParaRPr sz="2000" b="1" dirty="0">
               <a:solidFill>
-                <a:srgbClr val="FF0000"/>
+                <a:schemeClr val="tx1"/>
               </a:solidFill>
             </a:endParaRPr>
           </a:p>
           <a:p>
+            <a:pPr algn="l"/>
             <a:r>
               <a:rPr sz="2000" b="1" dirty="0">
                 <a:solidFill>
-                  <a:srgbClr val="FF0000"/>
+                  <a:schemeClr val="tx1"/>
                 </a:solidFill>
               </a:rPr>
               <a:t>• Aadan Abdirahman Aadan</a:t>
             </a:r>
           </a:p>
           <a:p>
+            <a:pPr algn="l"/>
             <a:endParaRPr sz="2000" b="1" dirty="0">
               <a:solidFill>
-                <a:srgbClr val="FF0000"/>
+                <a:schemeClr val="tx1"/>
               </a:solidFill>
             </a:endParaRPr>
           </a:p>
           <a:p>
+            <a:pPr algn="l"/>
             <a:r>
               <a:rPr sz="2000" b="1" dirty="0">
                 <a:solidFill>
-                  <a:srgbClr val="FF0000"/>
+                  <a:schemeClr val="tx1"/>
                 </a:solidFill>
               </a:rPr>
-              <a:t>Lecturer: MAXAMED CABDULQADIR XIRSI</a:t>
+              <a:t>Lecturer: </a:t>
+            </a:r>
+            <a:r>
+              <a:rPr lang="en-US" sz="2000" b="1" dirty="0">
+                <a:solidFill>
+                  <a:schemeClr val="tx1"/>
+                </a:solidFill>
+              </a:rPr>
+              <a:t>ENG-</a:t>
+            </a:r>
+            <a:r>
+              <a:rPr sz="2000" b="1" dirty="0">
+                <a:solidFill>
+                  <a:schemeClr val="tx1"/>
+                </a:solidFill>
+              </a:rPr>
+              <a:t>MAXAMED CABDULQADIR XIRSI</a:t>
             </a:r>
           </a:p>
         </p:txBody>
@@ -3270,6 +3278,46 @@
           </a:prstGeom>
         </p:spPr>
       </p:pic>
+      <p:sp>
+        <p:nvSpPr>
+          <p:cNvPr id="6" name="TextBox 5">
+            <a:extLst>
+              <a:ext uri="{FF2B5EF4-FFF2-40B4-BE49-F238E27FC236}">
+                <a16:creationId xmlns:a16="http://schemas.microsoft.com/office/drawing/2014/main" id="{4654BFA8-4A7D-DCF0-B88F-F39B3D076FCA}"/>
+              </a:ext>
+            </a:extLst>
+          </p:cNvPr>
+          <p:cNvSpPr txBox="1"/>
+          <p:nvPr/>
+        </p:nvSpPr>
+        <p:spPr>
+          <a:xfrm>
+            <a:off x="2754085" y="1755264"/>
+            <a:ext cx="4572000" cy="461665"/>
+          </a:xfrm>
+          <a:prstGeom prst="rect">
+            <a:avLst/>
+          </a:prstGeom>
+          <a:noFill/>
+        </p:spPr>
+        <p:txBody>
+          <a:bodyPr wrap="square">
+            <a:spAutoFit/>
+          </a:bodyPr>
+          <a:lstStyle/>
+          <a:p>
+            <a:pPr algn="l"/>
+            <a:r>
+              <a:rPr lang="en-US" sz="2400" b="1" dirty="0">
+                <a:solidFill>
+                  <a:schemeClr val="tx1"/>
+                </a:solidFill>
+              </a:rPr>
+              <a:t>Global Science University (GSU)</a:t>
+            </a:r>
+          </a:p>
+        </p:txBody>
+      </p:sp>
     </p:spTree>
   </p:cSld>
   <p:clrMapOvr>
@@ -3279,6 +3327,827 @@
 </file>
 
 <file path=ppt/slides/slide10.xml><?xml version="1.0" encoding="utf-8"?>
+<p:sld xmlns:a="http://schemas.openxmlformats.org/drawingml/2006/main" xmlns:r="http://schemas.openxmlformats.org/officeDocument/2006/relationships" xmlns:p="http://schemas.openxmlformats.org/presentationml/2006/main">
+  <p:cSld>
+    <p:spTree>
+      <p:nvGrpSpPr>
+        <p:cNvPr id="1" name="">
+          <a:extLst>
+            <a:ext uri="{FF2B5EF4-FFF2-40B4-BE49-F238E27FC236}">
+              <a16:creationId xmlns:a16="http://schemas.microsoft.com/office/drawing/2014/main" id="{EB57E68F-6B5C-7998-971C-876FACE714A0}"/>
+            </a:ext>
+          </a:extLst>
+        </p:cNvPr>
+        <p:cNvGrpSpPr/>
+        <p:nvPr/>
+      </p:nvGrpSpPr>
+      <p:grpSpPr>
+        <a:xfrm>
+          <a:off x="0" y="0"/>
+          <a:ext cx="0" cy="0"/>
+          <a:chOff x="0" y="0"/>
+          <a:chExt cx="0" cy="0"/>
+        </a:xfrm>
+      </p:grpSpPr>
+      <p:sp>
+        <p:nvSpPr>
+          <p:cNvPr id="2" name="Title 1">
+            <a:extLst>
+              <a:ext uri="{FF2B5EF4-FFF2-40B4-BE49-F238E27FC236}">
+                <a16:creationId xmlns:a16="http://schemas.microsoft.com/office/drawing/2014/main" id="{999E1FD4-21E4-D115-E01C-9689AC63B915}"/>
+              </a:ext>
+            </a:extLst>
+          </p:cNvPr>
+          <p:cNvSpPr>
+            <a:spLocks noGrp="1"/>
+          </p:cNvSpPr>
+          <p:nvPr>
+            <p:ph type="title"/>
+          </p:nvPr>
+        </p:nvSpPr>
+        <p:spPr/>
+        <p:txBody>
+          <a:bodyPr/>
+          <a:lstStyle/>
+          <a:p>
+            <a:r>
+              <a:rPr b="1" dirty="0"/>
+              <a:t>Admin Module</a:t>
+            </a:r>
+            <a:r>
+              <a:rPr lang="en-US" b="1" dirty="0"/>
+              <a:t>s</a:t>
+            </a:r>
+            <a:endParaRPr b="1" dirty="0"/>
+          </a:p>
+        </p:txBody>
+      </p:sp>
+      <p:sp>
+        <p:nvSpPr>
+          <p:cNvPr id="3" name="Content Placeholder 2">
+            <a:extLst>
+              <a:ext uri="{FF2B5EF4-FFF2-40B4-BE49-F238E27FC236}">
+                <a16:creationId xmlns:a16="http://schemas.microsoft.com/office/drawing/2014/main" id="{DA20FA00-BA8F-FCF5-992E-7CA2B653B740}"/>
+              </a:ext>
+            </a:extLst>
+          </p:cNvPr>
+          <p:cNvSpPr>
+            <a:spLocks noGrp="1"/>
+          </p:cNvSpPr>
+          <p:nvPr>
+            <p:ph idx="1"/>
+          </p:nvPr>
+        </p:nvSpPr>
+        <p:spPr/>
+        <p:txBody>
+          <a:bodyPr/>
+          <a:lstStyle/>
+          <a:p>
+            <a:pPr marL="0" indent="0">
+              <a:buNone/>
+            </a:pPr>
+            <a:r>
+              <a:rPr lang="en-US" dirty="0"/>
+              <a:t>Manage </a:t>
+            </a:r>
+            <a:r>
+              <a:rPr lang="en-US" b="1" dirty="0"/>
+              <a:t>Patients </a:t>
+            </a:r>
+            <a:r>
+              <a:rPr dirty="0"/>
+              <a:t>&amp; </a:t>
+            </a:r>
+            <a:r>
+              <a:rPr lang="en-US" b="1" dirty="0"/>
+              <a:t>Appointment</a:t>
+            </a:r>
+          </a:p>
+          <a:p>
+            <a:pPr>
+              <a:buFont typeface="Wingdings" panose="05000000000000000000" pitchFamily="2" charset="2"/>
+              <a:buChar char="q"/>
+            </a:pPr>
+            <a:r>
+              <a:rPr lang="en-US" sz="2000" dirty="0"/>
+              <a:t>These two sections are Manage Patients &amp; Appointment </a:t>
+            </a:r>
+            <a:r>
+              <a:rPr lang="en-US" sz="2000" b="1" dirty="0"/>
+              <a:t>admin</a:t>
+            </a:r>
+            <a:r>
+              <a:rPr lang="en-US" sz="2000" dirty="0"/>
+              <a:t> has the ability to manage these two</a:t>
+            </a:r>
+          </a:p>
+        </p:txBody>
+      </p:sp>
+      <p:pic>
+        <p:nvPicPr>
+          <p:cNvPr id="6" name="Picture 5">
+            <a:extLst>
+              <a:ext uri="{FF2B5EF4-FFF2-40B4-BE49-F238E27FC236}">
+                <a16:creationId xmlns:a16="http://schemas.microsoft.com/office/drawing/2014/main" id="{93E6DFBF-56B6-02D5-7506-0B035C5ADC3F}"/>
+              </a:ext>
+            </a:extLst>
+          </p:cNvPr>
+          <p:cNvPicPr>
+            <a:picLocks noChangeAspect="1"/>
+          </p:cNvPicPr>
+          <p:nvPr/>
+        </p:nvPicPr>
+        <p:blipFill>
+          <a:blip r:embed="rId2"/>
+          <a:stretch>
+            <a:fillRect/>
+          </a:stretch>
+        </p:blipFill>
+        <p:spPr>
+          <a:xfrm>
+            <a:off x="4657494" y="3985515"/>
+            <a:ext cx="4305633" cy="2006420"/>
+          </a:xfrm>
+          <a:prstGeom prst="rect">
+            <a:avLst/>
+          </a:prstGeom>
+        </p:spPr>
+      </p:pic>
+      <p:pic>
+        <p:nvPicPr>
+          <p:cNvPr id="8" name="Picture 7">
+            <a:extLst>
+              <a:ext uri="{FF2B5EF4-FFF2-40B4-BE49-F238E27FC236}">
+                <a16:creationId xmlns:a16="http://schemas.microsoft.com/office/drawing/2014/main" id="{894E4509-E43A-CB6A-EA47-9F205A7FA9D4}"/>
+              </a:ext>
+            </a:extLst>
+          </p:cNvPr>
+          <p:cNvPicPr>
+            <a:picLocks noChangeAspect="1"/>
+          </p:cNvPicPr>
+          <p:nvPr/>
+        </p:nvPicPr>
+        <p:blipFill>
+          <a:blip r:embed="rId3"/>
+          <a:stretch>
+            <a:fillRect/>
+          </a:stretch>
+        </p:blipFill>
+        <p:spPr>
+          <a:xfrm>
+            <a:off x="98897" y="3985515"/>
+            <a:ext cx="4306559" cy="1996388"/>
+          </a:xfrm>
+          <a:prstGeom prst="rect">
+            <a:avLst/>
+          </a:prstGeom>
+        </p:spPr>
+      </p:pic>
+      <p:sp>
+        <p:nvSpPr>
+          <p:cNvPr id="9" name="TextBox 8">
+            <a:extLst>
+              <a:ext uri="{FF2B5EF4-FFF2-40B4-BE49-F238E27FC236}">
+                <a16:creationId xmlns:a16="http://schemas.microsoft.com/office/drawing/2014/main" id="{E682C66F-F579-76AA-29E2-1ED80822819B}"/>
+              </a:ext>
+            </a:extLst>
+          </p:cNvPr>
+          <p:cNvSpPr txBox="1"/>
+          <p:nvPr/>
+        </p:nvSpPr>
+        <p:spPr>
+          <a:xfrm>
+            <a:off x="729343" y="3292365"/>
+            <a:ext cx="2090057" cy="400110"/>
+          </a:xfrm>
+          <a:prstGeom prst="rect">
+            <a:avLst/>
+          </a:prstGeom>
+          <a:noFill/>
+        </p:spPr>
+        <p:txBody>
+          <a:bodyPr wrap="square">
+            <a:spAutoFit/>
+          </a:bodyPr>
+          <a:lstStyle/>
+          <a:p>
+            <a:r>
+              <a:rPr lang="en-US" sz="2000" dirty="0"/>
+              <a:t>Manage </a:t>
+            </a:r>
+            <a:r>
+              <a:rPr lang="en-US" sz="2000" b="1" dirty="0"/>
+              <a:t>Patients</a:t>
+            </a:r>
+          </a:p>
+        </p:txBody>
+      </p:sp>
+      <p:sp>
+        <p:nvSpPr>
+          <p:cNvPr id="10" name="TextBox 9">
+            <a:extLst>
+              <a:ext uri="{FF2B5EF4-FFF2-40B4-BE49-F238E27FC236}">
+                <a16:creationId xmlns:a16="http://schemas.microsoft.com/office/drawing/2014/main" id="{8C034D7C-8BF6-4F59-96A4-E71AC621754B}"/>
+              </a:ext>
+            </a:extLst>
+          </p:cNvPr>
+          <p:cNvSpPr txBox="1"/>
+          <p:nvPr/>
+        </p:nvSpPr>
+        <p:spPr>
+          <a:xfrm>
+            <a:off x="5540830" y="3292365"/>
+            <a:ext cx="2575766" cy="400110"/>
+          </a:xfrm>
+          <a:prstGeom prst="rect">
+            <a:avLst/>
+          </a:prstGeom>
+          <a:noFill/>
+        </p:spPr>
+        <p:txBody>
+          <a:bodyPr wrap="square">
+            <a:spAutoFit/>
+          </a:bodyPr>
+          <a:lstStyle/>
+          <a:p>
+            <a:r>
+              <a:rPr lang="en-US" sz="2000" dirty="0"/>
+              <a:t>Manage </a:t>
+            </a:r>
+            <a:r>
+              <a:rPr lang="en-US" sz="2000" b="1" dirty="0"/>
+              <a:t>Appointment</a:t>
+            </a:r>
+          </a:p>
+        </p:txBody>
+      </p:sp>
+    </p:spTree>
+    <p:extLst>
+      <p:ext uri="{BB962C8B-B14F-4D97-AF65-F5344CB8AC3E}">
+        <p14:creationId xmlns:p14="http://schemas.microsoft.com/office/powerpoint/2010/main" val="3698749665"/>
+      </p:ext>
+    </p:extLst>
+  </p:cSld>
+  <p:clrMapOvr>
+    <a:masterClrMapping/>
+  </p:clrMapOvr>
+</p:sld>
+</file>
+
+<file path=ppt/slides/slide11.xml><?xml version="1.0" encoding="utf-8"?>
+<p:sld xmlns:a="http://schemas.openxmlformats.org/drawingml/2006/main" xmlns:r="http://schemas.openxmlformats.org/officeDocument/2006/relationships" xmlns:p="http://schemas.openxmlformats.org/presentationml/2006/main">
+  <p:cSld>
+    <p:spTree>
+      <p:nvGrpSpPr>
+        <p:cNvPr id="1" name="">
+          <a:extLst>
+            <a:ext uri="{FF2B5EF4-FFF2-40B4-BE49-F238E27FC236}">
+              <a16:creationId xmlns:a16="http://schemas.microsoft.com/office/drawing/2014/main" id="{CBCB91A9-C1B6-B7C0-B0A2-6F8127051F85}"/>
+            </a:ext>
+          </a:extLst>
+        </p:cNvPr>
+        <p:cNvGrpSpPr/>
+        <p:nvPr/>
+      </p:nvGrpSpPr>
+      <p:grpSpPr>
+        <a:xfrm>
+          <a:off x="0" y="0"/>
+          <a:ext cx="0" cy="0"/>
+          <a:chOff x="0" y="0"/>
+          <a:chExt cx="0" cy="0"/>
+        </a:xfrm>
+      </p:grpSpPr>
+      <p:sp>
+        <p:nvSpPr>
+          <p:cNvPr id="2" name="Title 1">
+            <a:extLst>
+              <a:ext uri="{FF2B5EF4-FFF2-40B4-BE49-F238E27FC236}">
+                <a16:creationId xmlns:a16="http://schemas.microsoft.com/office/drawing/2014/main" id="{9D5107F8-316C-5F30-A0B4-932393AB20E3}"/>
+              </a:ext>
+            </a:extLst>
+          </p:cNvPr>
+          <p:cNvSpPr>
+            <a:spLocks noGrp="1"/>
+          </p:cNvSpPr>
+          <p:nvPr>
+            <p:ph type="title"/>
+          </p:nvPr>
+        </p:nvSpPr>
+        <p:spPr/>
+        <p:txBody>
+          <a:bodyPr/>
+          <a:lstStyle/>
+          <a:p>
+            <a:r>
+              <a:rPr b="1" dirty="0"/>
+              <a:t>Admin Module</a:t>
+            </a:r>
+            <a:r>
+              <a:rPr lang="en-US" b="1" dirty="0"/>
+              <a:t>s</a:t>
+            </a:r>
+            <a:endParaRPr b="1" dirty="0"/>
+          </a:p>
+        </p:txBody>
+      </p:sp>
+      <p:sp>
+        <p:nvSpPr>
+          <p:cNvPr id="3" name="Content Placeholder 2">
+            <a:extLst>
+              <a:ext uri="{FF2B5EF4-FFF2-40B4-BE49-F238E27FC236}">
+                <a16:creationId xmlns:a16="http://schemas.microsoft.com/office/drawing/2014/main" id="{AB354ADC-2E7C-AB07-C04E-1D06DDBFB9C1}"/>
+              </a:ext>
+            </a:extLst>
+          </p:cNvPr>
+          <p:cNvSpPr>
+            <a:spLocks noGrp="1"/>
+          </p:cNvSpPr>
+          <p:nvPr>
+            <p:ph idx="1"/>
+          </p:nvPr>
+        </p:nvSpPr>
+        <p:spPr/>
+        <p:txBody>
+          <a:bodyPr>
+            <a:normAutofit/>
+          </a:bodyPr>
+          <a:lstStyle/>
+          <a:p>
+            <a:pPr marL="0" indent="0">
+              <a:buNone/>
+            </a:pPr>
+            <a:r>
+              <a:rPr sz="2400" b="1" dirty="0"/>
+              <a:t>Manage </a:t>
+            </a:r>
+            <a:r>
+              <a:rPr lang="en-US" sz="2400" b="1" dirty="0"/>
+              <a:t>Session Logs</a:t>
+            </a:r>
+            <a:endParaRPr sz="2400" b="1" dirty="0"/>
+          </a:p>
+        </p:txBody>
+      </p:sp>
+      <p:pic>
+        <p:nvPicPr>
+          <p:cNvPr id="6" name="Picture 5">
+            <a:extLst>
+              <a:ext uri="{FF2B5EF4-FFF2-40B4-BE49-F238E27FC236}">
+                <a16:creationId xmlns:a16="http://schemas.microsoft.com/office/drawing/2014/main" id="{50300BDC-246A-6CAB-D2A1-B6960041410D}"/>
+              </a:ext>
+            </a:extLst>
+          </p:cNvPr>
+          <p:cNvPicPr>
+            <a:picLocks noChangeAspect="1"/>
+          </p:cNvPicPr>
+          <p:nvPr/>
+        </p:nvPicPr>
+        <p:blipFill>
+          <a:blip r:embed="rId2"/>
+          <a:stretch>
+            <a:fillRect/>
+          </a:stretch>
+        </p:blipFill>
+        <p:spPr>
+          <a:xfrm>
+            <a:off x="248634" y="3677788"/>
+            <a:ext cx="4323366" cy="2054624"/>
+          </a:xfrm>
+          <a:prstGeom prst="rect">
+            <a:avLst/>
+          </a:prstGeom>
+        </p:spPr>
+      </p:pic>
+      <p:pic>
+        <p:nvPicPr>
+          <p:cNvPr id="8" name="Picture 7">
+            <a:extLst>
+              <a:ext uri="{FF2B5EF4-FFF2-40B4-BE49-F238E27FC236}">
+                <a16:creationId xmlns:a16="http://schemas.microsoft.com/office/drawing/2014/main" id="{63A672F8-A92B-658C-9E54-B0944EA6ADE1}"/>
+              </a:ext>
+            </a:extLst>
+          </p:cNvPr>
+          <p:cNvPicPr>
+            <a:picLocks noChangeAspect="1"/>
+          </p:cNvPicPr>
+          <p:nvPr/>
+        </p:nvPicPr>
+        <p:blipFill>
+          <a:blip r:embed="rId3"/>
+          <a:stretch>
+            <a:fillRect/>
+          </a:stretch>
+        </p:blipFill>
+        <p:spPr>
+          <a:xfrm>
+            <a:off x="4659086" y="3665883"/>
+            <a:ext cx="4313652" cy="2066529"/>
+          </a:xfrm>
+          <a:prstGeom prst="rect">
+            <a:avLst/>
+          </a:prstGeom>
+        </p:spPr>
+      </p:pic>
+      <p:sp>
+        <p:nvSpPr>
+          <p:cNvPr id="12" name="TextBox 11">
+            <a:extLst>
+              <a:ext uri="{FF2B5EF4-FFF2-40B4-BE49-F238E27FC236}">
+                <a16:creationId xmlns:a16="http://schemas.microsoft.com/office/drawing/2014/main" id="{E1FF3B03-EADA-37D9-C4B0-828B98BA51BF}"/>
+              </a:ext>
+            </a:extLst>
+          </p:cNvPr>
+          <p:cNvSpPr txBox="1"/>
+          <p:nvPr/>
+        </p:nvSpPr>
+        <p:spPr>
+          <a:xfrm>
+            <a:off x="936171" y="3059668"/>
+            <a:ext cx="2329543" cy="400110"/>
+          </a:xfrm>
+          <a:prstGeom prst="rect">
+            <a:avLst/>
+          </a:prstGeom>
+          <a:noFill/>
+        </p:spPr>
+        <p:txBody>
+          <a:bodyPr wrap="square">
+            <a:spAutoFit/>
+          </a:bodyPr>
+          <a:lstStyle/>
+          <a:p>
+            <a:r>
+              <a:rPr lang="en-US" sz="2000" b="1" dirty="0"/>
+              <a:t>Doctor Session Logs</a:t>
+            </a:r>
+          </a:p>
+        </p:txBody>
+      </p:sp>
+      <p:sp>
+        <p:nvSpPr>
+          <p:cNvPr id="14" name="TextBox 13">
+            <a:extLst>
+              <a:ext uri="{FF2B5EF4-FFF2-40B4-BE49-F238E27FC236}">
+                <a16:creationId xmlns:a16="http://schemas.microsoft.com/office/drawing/2014/main" id="{AE11689E-C1F8-EA5F-3DA6-A3FB98E2F651}"/>
+              </a:ext>
+            </a:extLst>
+          </p:cNvPr>
+          <p:cNvSpPr txBox="1"/>
+          <p:nvPr/>
+        </p:nvSpPr>
+        <p:spPr>
+          <a:xfrm>
+            <a:off x="5702848" y="3072077"/>
+            <a:ext cx="2226128" cy="400110"/>
+          </a:xfrm>
+          <a:prstGeom prst="rect">
+            <a:avLst/>
+          </a:prstGeom>
+          <a:noFill/>
+        </p:spPr>
+        <p:txBody>
+          <a:bodyPr wrap="square">
+            <a:spAutoFit/>
+          </a:bodyPr>
+          <a:lstStyle/>
+          <a:p>
+            <a:r>
+              <a:rPr lang="en-US" sz="2000" b="1" dirty="0"/>
+              <a:t>User Session Logs</a:t>
+            </a:r>
+          </a:p>
+        </p:txBody>
+      </p:sp>
+      <p:sp>
+        <p:nvSpPr>
+          <p:cNvPr id="16" name="TextBox 15">
+            <a:extLst>
+              <a:ext uri="{FF2B5EF4-FFF2-40B4-BE49-F238E27FC236}">
+                <a16:creationId xmlns:a16="http://schemas.microsoft.com/office/drawing/2014/main" id="{AC7D17F4-A253-74AC-7CCB-D374200D1DB0}"/>
+              </a:ext>
+            </a:extLst>
+          </p:cNvPr>
+          <p:cNvSpPr txBox="1"/>
+          <p:nvPr/>
+        </p:nvSpPr>
+        <p:spPr>
+          <a:xfrm>
+            <a:off x="248634" y="2095484"/>
+            <a:ext cx="7108371" cy="646331"/>
+          </a:xfrm>
+          <a:prstGeom prst="rect">
+            <a:avLst/>
+          </a:prstGeom>
+          <a:noFill/>
+        </p:spPr>
+        <p:txBody>
+          <a:bodyPr wrap="square">
+            <a:spAutoFit/>
+          </a:bodyPr>
+          <a:lstStyle/>
+          <a:p>
+            <a:pPr marL="285750" indent="-285750">
+              <a:buFont typeface="Wingdings" panose="05000000000000000000" pitchFamily="2" charset="2"/>
+              <a:buChar char="q"/>
+            </a:pPr>
+            <a:r>
+              <a:rPr lang="en-US" dirty="0"/>
+              <a:t>The admin has the ability to track (Session Logs) users using the system in two ways: Doctor Session Logs User Session Logs</a:t>
+            </a:r>
+          </a:p>
+        </p:txBody>
+      </p:sp>
+    </p:spTree>
+    <p:extLst>
+      <p:ext uri="{BB962C8B-B14F-4D97-AF65-F5344CB8AC3E}">
+        <p14:creationId xmlns:p14="http://schemas.microsoft.com/office/powerpoint/2010/main" val="3125414554"/>
+      </p:ext>
+    </p:extLst>
+  </p:cSld>
+  <p:clrMapOvr>
+    <a:masterClrMapping/>
+  </p:clrMapOvr>
+</p:sld>
+</file>
+
+<file path=ppt/slides/slide12.xml><?xml version="1.0" encoding="utf-8"?>
+<p:sld xmlns:a="http://schemas.openxmlformats.org/drawingml/2006/main" xmlns:r="http://schemas.openxmlformats.org/officeDocument/2006/relationships" xmlns:p="http://schemas.openxmlformats.org/presentationml/2006/main">
+  <p:cSld>
+    <p:spTree>
+      <p:nvGrpSpPr>
+        <p:cNvPr id="1" name="">
+          <a:extLst>
+            <a:ext uri="{FF2B5EF4-FFF2-40B4-BE49-F238E27FC236}">
+              <a16:creationId xmlns:a16="http://schemas.microsoft.com/office/drawing/2014/main" id="{F6182F68-BDD2-857E-AA30-CA14B92E3F30}"/>
+            </a:ext>
+          </a:extLst>
+        </p:cNvPr>
+        <p:cNvGrpSpPr/>
+        <p:nvPr/>
+      </p:nvGrpSpPr>
+      <p:grpSpPr>
+        <a:xfrm>
+          <a:off x="0" y="0"/>
+          <a:ext cx="0" cy="0"/>
+          <a:chOff x="0" y="0"/>
+          <a:chExt cx="0" cy="0"/>
+        </a:xfrm>
+      </p:grpSpPr>
+      <p:sp>
+        <p:nvSpPr>
+          <p:cNvPr id="2" name="Title 1">
+            <a:extLst>
+              <a:ext uri="{FF2B5EF4-FFF2-40B4-BE49-F238E27FC236}">
+                <a16:creationId xmlns:a16="http://schemas.microsoft.com/office/drawing/2014/main" id="{B8B21EC5-DADF-2FD6-402E-C8E7B395210B}"/>
+              </a:ext>
+            </a:extLst>
+          </p:cNvPr>
+          <p:cNvSpPr>
+            <a:spLocks noGrp="1"/>
+          </p:cNvSpPr>
+          <p:nvPr>
+            <p:ph type="title"/>
+          </p:nvPr>
+        </p:nvSpPr>
+        <p:spPr/>
+        <p:txBody>
+          <a:bodyPr/>
+          <a:lstStyle/>
+          <a:p>
+            <a:r>
+              <a:rPr b="1" dirty="0"/>
+              <a:t>Admin Module</a:t>
+            </a:r>
+            <a:r>
+              <a:rPr lang="en-US" b="1" dirty="0"/>
+              <a:t>s</a:t>
+            </a:r>
+            <a:endParaRPr b="1" dirty="0"/>
+          </a:p>
+        </p:txBody>
+      </p:sp>
+      <p:sp>
+        <p:nvSpPr>
+          <p:cNvPr id="3" name="Content Placeholder 2">
+            <a:extLst>
+              <a:ext uri="{FF2B5EF4-FFF2-40B4-BE49-F238E27FC236}">
+                <a16:creationId xmlns:a16="http://schemas.microsoft.com/office/drawing/2014/main" id="{C305DF28-8FF0-68EF-2FD6-C9E3B2EDC675}"/>
+              </a:ext>
+            </a:extLst>
+          </p:cNvPr>
+          <p:cNvSpPr>
+            <a:spLocks noGrp="1"/>
+          </p:cNvSpPr>
+          <p:nvPr>
+            <p:ph idx="1"/>
+          </p:nvPr>
+        </p:nvSpPr>
+        <p:spPr>
+          <a:xfrm>
+            <a:off x="457199" y="1589583"/>
+            <a:ext cx="4849586" cy="557788"/>
+          </a:xfrm>
+        </p:spPr>
+        <p:txBody>
+          <a:bodyPr>
+            <a:normAutofit/>
+          </a:bodyPr>
+          <a:lstStyle/>
+          <a:p>
+            <a:pPr marL="0" indent="0">
+              <a:buNone/>
+            </a:pPr>
+            <a:r>
+              <a:rPr lang="en-US" sz="2800" b="1" dirty="0"/>
+              <a:t>Manage Queries &amp; Reports</a:t>
+            </a:r>
+            <a:endParaRPr sz="2800" b="1" dirty="0"/>
+          </a:p>
+        </p:txBody>
+      </p:sp>
+      <p:pic>
+        <p:nvPicPr>
+          <p:cNvPr id="8" name="Picture 7">
+            <a:extLst>
+              <a:ext uri="{FF2B5EF4-FFF2-40B4-BE49-F238E27FC236}">
+                <a16:creationId xmlns:a16="http://schemas.microsoft.com/office/drawing/2014/main" id="{6D20E790-F07F-F892-903E-B31521069D9C}"/>
+              </a:ext>
+            </a:extLst>
+          </p:cNvPr>
+          <p:cNvPicPr>
+            <a:picLocks noChangeAspect="1"/>
+          </p:cNvPicPr>
+          <p:nvPr/>
+        </p:nvPicPr>
+        <p:blipFill>
+          <a:blip r:embed="rId2"/>
+          <a:stretch>
+            <a:fillRect/>
+          </a:stretch>
+        </p:blipFill>
+        <p:spPr>
+          <a:xfrm>
+            <a:off x="184285" y="3429015"/>
+            <a:ext cx="4387715" cy="2063723"/>
+          </a:xfrm>
+          <a:prstGeom prst="rect">
+            <a:avLst/>
+          </a:prstGeom>
+        </p:spPr>
+      </p:pic>
+      <p:pic>
+        <p:nvPicPr>
+          <p:cNvPr id="10" name="Picture 9">
+            <a:extLst>
+              <a:ext uri="{FF2B5EF4-FFF2-40B4-BE49-F238E27FC236}">
+                <a16:creationId xmlns:a16="http://schemas.microsoft.com/office/drawing/2014/main" id="{7C879A02-E345-3F77-D0A9-103B43D817C2}"/>
+              </a:ext>
+            </a:extLst>
+          </p:cNvPr>
+          <p:cNvPicPr>
+            <a:picLocks noChangeAspect="1"/>
+          </p:cNvPicPr>
+          <p:nvPr/>
+        </p:nvPicPr>
+        <p:blipFill>
+          <a:blip r:embed="rId3"/>
+          <a:stretch>
+            <a:fillRect/>
+          </a:stretch>
+        </p:blipFill>
+        <p:spPr>
+          <a:xfrm>
+            <a:off x="4675414" y="3428999"/>
+            <a:ext cx="4387716" cy="2063313"/>
+          </a:xfrm>
+          <a:prstGeom prst="rect">
+            <a:avLst/>
+          </a:prstGeom>
+        </p:spPr>
+      </p:pic>
+      <p:sp>
+        <p:nvSpPr>
+          <p:cNvPr id="12" name="TextBox 11">
+            <a:extLst>
+              <a:ext uri="{FF2B5EF4-FFF2-40B4-BE49-F238E27FC236}">
+                <a16:creationId xmlns:a16="http://schemas.microsoft.com/office/drawing/2014/main" id="{110CB2A6-F8DE-5E64-6F9E-2563C20E6E46}"/>
+              </a:ext>
+            </a:extLst>
+          </p:cNvPr>
+          <p:cNvSpPr txBox="1"/>
+          <p:nvPr/>
+        </p:nvSpPr>
+        <p:spPr>
+          <a:xfrm>
+            <a:off x="1121229" y="2895600"/>
+            <a:ext cx="2155371" cy="400110"/>
+          </a:xfrm>
+          <a:prstGeom prst="rect">
+            <a:avLst/>
+          </a:prstGeom>
+          <a:noFill/>
+        </p:spPr>
+        <p:txBody>
+          <a:bodyPr wrap="square">
+            <a:spAutoFit/>
+          </a:bodyPr>
+          <a:lstStyle/>
+          <a:p>
+            <a:r>
+              <a:rPr lang="en-US" sz="2000" b="1" dirty="0"/>
+              <a:t>Manage Queries </a:t>
+            </a:r>
+          </a:p>
+        </p:txBody>
+      </p:sp>
+      <p:sp>
+        <p:nvSpPr>
+          <p:cNvPr id="13" name="TextBox 12">
+            <a:extLst>
+              <a:ext uri="{FF2B5EF4-FFF2-40B4-BE49-F238E27FC236}">
+                <a16:creationId xmlns:a16="http://schemas.microsoft.com/office/drawing/2014/main" id="{2F6F8047-6585-1EB1-1459-F1159F6781ED}"/>
+              </a:ext>
+            </a:extLst>
+          </p:cNvPr>
+          <p:cNvSpPr txBox="1"/>
+          <p:nvPr/>
+        </p:nvSpPr>
+        <p:spPr>
+          <a:xfrm>
+            <a:off x="5562600" y="2917371"/>
+            <a:ext cx="2155371" cy="400110"/>
+          </a:xfrm>
+          <a:prstGeom prst="rect">
+            <a:avLst/>
+          </a:prstGeom>
+          <a:noFill/>
+        </p:spPr>
+        <p:txBody>
+          <a:bodyPr wrap="square">
+            <a:spAutoFit/>
+          </a:bodyPr>
+          <a:lstStyle/>
+          <a:p>
+            <a:r>
+              <a:rPr lang="en-US" sz="2000" b="1" dirty="0"/>
+              <a:t>Manage Reports</a:t>
+            </a:r>
+          </a:p>
+        </p:txBody>
+      </p:sp>
+      <p:sp>
+        <p:nvSpPr>
+          <p:cNvPr id="15" name="TextBox 14">
+            <a:extLst>
+              <a:ext uri="{FF2B5EF4-FFF2-40B4-BE49-F238E27FC236}">
+                <a16:creationId xmlns:a16="http://schemas.microsoft.com/office/drawing/2014/main" id="{36210457-C0A8-C00A-B27D-937B1FEB5378}"/>
+              </a:ext>
+            </a:extLst>
+          </p:cNvPr>
+          <p:cNvSpPr txBox="1"/>
+          <p:nvPr/>
+        </p:nvSpPr>
+        <p:spPr>
+          <a:xfrm>
+            <a:off x="457199" y="2157988"/>
+            <a:ext cx="7260771" cy="369332"/>
+          </a:xfrm>
+          <a:prstGeom prst="rect">
+            <a:avLst/>
+          </a:prstGeom>
+          <a:noFill/>
+        </p:spPr>
+        <p:txBody>
+          <a:bodyPr wrap="square">
+            <a:spAutoFit/>
+          </a:bodyPr>
+          <a:lstStyle/>
+          <a:p>
+            <a:pPr marL="285750" indent="-285750">
+              <a:buFont typeface="Wingdings" panose="05000000000000000000" pitchFamily="2" charset="2"/>
+              <a:buChar char="q"/>
+            </a:pPr>
+            <a:r>
+              <a:rPr lang="en-US" dirty="0"/>
+              <a:t>These sections enable the Admin to manage Queries &amp; Reports,</a:t>
+            </a:r>
+          </a:p>
+        </p:txBody>
+      </p:sp>
+    </p:spTree>
+    <p:extLst>
+      <p:ext uri="{BB962C8B-B14F-4D97-AF65-F5344CB8AC3E}">
+        <p14:creationId xmlns:p14="http://schemas.microsoft.com/office/powerpoint/2010/main" val="2963863863"/>
+      </p:ext>
+    </p:extLst>
+  </p:cSld>
+  <p:clrMapOvr>
+    <a:masterClrMapping/>
+  </p:clrMapOvr>
+</p:sld>
+</file>
+
+<file path=ppt/slides/slide13.xml><?xml version="1.0" encoding="utf-8"?>
 <p:sld xmlns:a="http://schemas.openxmlformats.org/drawingml/2006/main" xmlns:r="http://schemas.openxmlformats.org/officeDocument/2006/relationships" xmlns:p="http://schemas.openxmlformats.org/presentationml/2006/main">
   <p:cSld>
     <p:spTree>
@@ -3311,120 +4180,85 @@
           <a:lstStyle/>
           <a:p>
             <a:r>
-              <a:t>System Benefits</a:t>
-            </a:r>
-          </a:p>
-        </p:txBody>
-      </p:sp>
-      <p:sp>
-        <p:nvSpPr>
-          <p:cNvPr id="3" name="Content Placeholder 2"/>
-          <p:cNvSpPr>
-            <a:spLocks noGrp="1"/>
-          </p:cNvSpPr>
+              <a:rPr dirty="0"/>
+              <a:t>Patient </a:t>
+            </a:r>
+            <a:r>
+              <a:rPr lang="en-US" dirty="0"/>
+              <a:t>Dashboard</a:t>
+            </a:r>
+            <a:endParaRPr dirty="0"/>
+          </a:p>
+        </p:txBody>
+      </p:sp>
+      <p:pic>
+        <p:nvPicPr>
+          <p:cNvPr id="5" name="Content Placeholder 4">
+            <a:extLst>
+              <a:ext uri="{FF2B5EF4-FFF2-40B4-BE49-F238E27FC236}">
+                <a16:creationId xmlns:a16="http://schemas.microsoft.com/office/drawing/2014/main" id="{DDAC5BCA-582A-9A11-637C-A7B217C1E0E9}"/>
+              </a:ext>
+            </a:extLst>
+          </p:cNvPr>
+          <p:cNvPicPr>
+            <a:picLocks noGrp="1" noChangeAspect="1"/>
+          </p:cNvPicPr>
           <p:nvPr>
             <p:ph idx="1"/>
           </p:nvPr>
-        </p:nvSpPr>
-        <p:spPr/>
-        <p:txBody>
-          <a:bodyPr/>
-          <a:lstStyle/>
-          <a:p>
-            <a:r>
-              <a:t>Time saving &amp; automation</a:t>
-            </a:r>
-          </a:p>
-          <a:p>
-            <a:r>
-              <a:t>Accurate &amp; reliable data</a:t>
-            </a:r>
-          </a:p>
-          <a:p>
-            <a:r>
-              <a:t>Online appointment system</a:t>
-            </a:r>
-          </a:p>
-          <a:p>
-            <a:r>
-              <a:t>Responsive design (Mobile &amp; Desktop)</a:t>
-            </a:r>
-          </a:p>
-        </p:txBody>
-      </p:sp>
-    </p:spTree>
-  </p:cSld>
-  <p:clrMapOvr>
-    <a:masterClrMapping/>
-  </p:clrMapOvr>
-</p:sld>
-</file>
-
-<file path=ppt/slides/slide11.xml><?xml version="1.0" encoding="utf-8"?>
-<p:sld xmlns:a="http://schemas.openxmlformats.org/drawingml/2006/main" xmlns:r="http://schemas.openxmlformats.org/officeDocument/2006/relationships" xmlns:p="http://schemas.openxmlformats.org/presentationml/2006/main">
-  <p:cSld>
-    <p:spTree>
-      <p:nvGrpSpPr>
-        <p:cNvPr id="1" name=""/>
-        <p:cNvGrpSpPr/>
-        <p:nvPr/>
-      </p:nvGrpSpPr>
-      <p:grpSpPr>
-        <a:xfrm>
-          <a:off x="0" y="0"/>
-          <a:ext cx="0" cy="0"/>
-          <a:chOff x="0" y="0"/>
-          <a:chExt cx="0" cy="0"/>
-        </a:xfrm>
-      </p:grpSpPr>
-      <p:sp>
-        <p:nvSpPr>
-          <p:cNvPr id="2" name="Title 1"/>
-          <p:cNvSpPr>
-            <a:spLocks noGrp="1"/>
-          </p:cNvSpPr>
-          <p:nvPr>
-            <p:ph type="title"/>
-          </p:nvPr>
-        </p:nvSpPr>
-        <p:spPr/>
-        <p:txBody>
-          <a:bodyPr/>
-          <a:lstStyle/>
-          <a:p>
-            <a:r>
-              <a:t>Conclusion</a:t>
-            </a:r>
-          </a:p>
-        </p:txBody>
-      </p:sp>
-      <p:sp>
-        <p:nvSpPr>
-          <p:cNvPr id="3" name="Content Placeholder 2"/>
-          <p:cNvSpPr>
-            <a:spLocks noGrp="1"/>
-          </p:cNvSpPr>
-          <p:nvPr>
-            <p:ph idx="1"/>
-          </p:nvPr>
-        </p:nvSpPr>
-        <p:spPr/>
-        <p:txBody>
-          <a:bodyPr/>
-          <a:lstStyle/>
-          <a:p>
-            <a:r>
-              <a:t>HMS waa modern solution for hospital management</a:t>
-            </a:r>
-          </a:p>
-          <a:p>
-            <a:r>
-              <a:t>Waxa uu isku xiraa dhammaan system users</a:t>
-            </a:r>
-          </a:p>
-          <a:p>
-            <a:r>
-              <a:t>Waxa uu kor u qaadaa service quality</a:t>
+        </p:nvPicPr>
+        <p:blipFill>
+          <a:blip r:embed="rId2"/>
+          <a:stretch>
+            <a:fillRect/>
+          </a:stretch>
+        </p:blipFill>
+        <p:spPr>
+          <a:xfrm>
+            <a:off x="381000" y="2329216"/>
+            <a:ext cx="8229600" cy="3786388"/>
+          </a:xfrm>
+        </p:spPr>
+      </p:pic>
+      <p:sp>
+        <p:nvSpPr>
+          <p:cNvPr id="7" name="TextBox 6">
+            <a:extLst>
+              <a:ext uri="{FF2B5EF4-FFF2-40B4-BE49-F238E27FC236}">
+                <a16:creationId xmlns:a16="http://schemas.microsoft.com/office/drawing/2014/main" id="{E6D79B6F-503A-1C4D-536F-3DB549699C16}"/>
+              </a:ext>
+            </a:extLst>
+          </p:cNvPr>
+          <p:cNvSpPr txBox="1"/>
+          <p:nvPr/>
+        </p:nvSpPr>
+        <p:spPr>
+          <a:xfrm>
+            <a:off x="381000" y="1657253"/>
+            <a:ext cx="7587342" cy="646331"/>
+          </a:xfrm>
+          <a:prstGeom prst="rect">
+            <a:avLst/>
+          </a:prstGeom>
+          <a:noFill/>
+        </p:spPr>
+        <p:txBody>
+          <a:bodyPr wrap="square">
+            <a:spAutoFit/>
+          </a:bodyPr>
+          <a:lstStyle/>
+          <a:p>
+            <a:r>
+              <a:rPr lang="en-US" dirty="0"/>
+              <a:t>The patient can only view this </a:t>
+            </a:r>
+            <a:r>
+              <a:rPr lang="en-US" b="1" dirty="0"/>
+              <a:t>dashboard</a:t>
+            </a:r>
+            <a:r>
+              <a:rPr lang="en-US" dirty="0"/>
+              <a:t>, book an appointment, and contact the doctor.</a:t>
             </a:r>
           </a:p>
         </p:txBody>
@@ -3470,7 +4304,7 @@
           <a:lstStyle/>
           <a:p>
             <a:r>
-              <a:t>Introduction</a:t>
+              <a:t>Technologies Used</a:t>
             </a:r>
           </a:p>
         </p:txBody>
@@ -3491,26 +4325,120 @@
           <a:lstStyle/>
           <a:p>
             <a:r>
-              <a:t>Hospital Management System (HMS) waa web-based system</a:t>
-            </a:r>
-          </a:p>
-          <a:p>
-            <a:r>
-              <a:t>System-ku wuxuu isku xiraa Admin, Doctor &amp; Patient</a:t>
-            </a:r>
-          </a:p>
-          <a:p>
-            <a:r>
-              <a:t>Waxa uu yareeyaa paperwork</a:t>
-            </a:r>
-          </a:p>
-          <a:p>
-            <a:r>
-              <a:t>Waxa uu kordhiyaa efficiency &amp; accuracy</a:t>
-            </a:r>
-          </a:p>
-        </p:txBody>
-      </p:sp>
+              <a:rPr dirty="0"/>
+              <a:t>Frontend: HTML, CSS, Bootstrap, JavaScript</a:t>
+            </a:r>
+          </a:p>
+          <a:p>
+            <a:r>
+              <a:rPr dirty="0"/>
+              <a:t>Backend: PHP</a:t>
+            </a:r>
+          </a:p>
+          <a:p>
+            <a:r>
+              <a:rPr dirty="0"/>
+              <a:t>Database: MySQL</a:t>
+            </a:r>
+          </a:p>
+          <a:p>
+            <a:r>
+              <a:rPr dirty="0"/>
+              <a:t>Server Environment: XAMPP</a:t>
+            </a:r>
+          </a:p>
+        </p:txBody>
+      </p:sp>
+      <p:pic>
+        <p:nvPicPr>
+          <p:cNvPr id="5" name="Picture 4">
+            <a:extLst>
+              <a:ext uri="{FF2B5EF4-FFF2-40B4-BE49-F238E27FC236}">
+                <a16:creationId xmlns:a16="http://schemas.microsoft.com/office/drawing/2014/main" id="{4CEE61C8-BD2F-6995-A358-54F812AA1B49}"/>
+              </a:ext>
+            </a:extLst>
+          </p:cNvPr>
+          <p:cNvPicPr>
+            <a:picLocks noChangeAspect="1"/>
+          </p:cNvPicPr>
+          <p:nvPr/>
+        </p:nvPicPr>
+        <p:blipFill>
+          <a:blip r:embed="rId2"/>
+          <a:stretch>
+            <a:fillRect/>
+          </a:stretch>
+        </p:blipFill>
+        <p:spPr>
+          <a:xfrm>
+            <a:off x="685615" y="3990080"/>
+            <a:ext cx="4387127" cy="2780831"/>
+          </a:xfrm>
+          <a:prstGeom prst="rect">
+            <a:avLst/>
+          </a:prstGeom>
+        </p:spPr>
+      </p:pic>
+      <p:pic>
+        <p:nvPicPr>
+          <p:cNvPr id="7" name="Picture 6">
+            <a:extLst>
+              <a:ext uri="{FF2B5EF4-FFF2-40B4-BE49-F238E27FC236}">
+                <a16:creationId xmlns:a16="http://schemas.microsoft.com/office/drawing/2014/main" id="{BC027044-6875-D5DD-E84A-F05D6DDA0A8D}"/>
+              </a:ext>
+            </a:extLst>
+          </p:cNvPr>
+          <p:cNvPicPr>
+            <a:picLocks noChangeAspect="1"/>
+          </p:cNvPicPr>
+          <p:nvPr/>
+        </p:nvPicPr>
+        <p:blipFill>
+          <a:blip r:embed="rId3"/>
+          <a:stretch>
+            <a:fillRect/>
+          </a:stretch>
+        </p:blipFill>
+        <p:spPr>
+          <a:xfrm>
+            <a:off x="4296038" y="3990080"/>
+            <a:ext cx="3546120" cy="1988379"/>
+          </a:xfrm>
+          <a:prstGeom prst="rect">
+            <a:avLst/>
+          </a:prstGeom>
+        </p:spPr>
+      </p:pic>
+      <p:pic>
+        <p:nvPicPr>
+          <p:cNvPr id="9" name="Picture 8">
+            <a:extLst>
+              <a:ext uri="{FF2B5EF4-FFF2-40B4-BE49-F238E27FC236}">
+                <a16:creationId xmlns:a16="http://schemas.microsoft.com/office/drawing/2014/main" id="{0AB59AFF-4124-BC3D-0FC9-47A4C9FC89E9}"/>
+              </a:ext>
+            </a:extLst>
+          </p:cNvPr>
+          <p:cNvPicPr>
+            <a:picLocks noChangeAspect="1"/>
+          </p:cNvPicPr>
+          <p:nvPr/>
+        </p:nvPicPr>
+        <p:blipFill>
+          <a:blip r:embed="rId4"/>
+          <a:stretch>
+            <a:fillRect/>
+          </a:stretch>
+        </p:blipFill>
+        <p:spPr>
+          <a:xfrm>
+            <a:off x="6231008" y="3429000"/>
+            <a:ext cx="3257030" cy="3257030"/>
+          </a:xfrm>
+          <a:prstGeom prst="rect">
+            <a:avLst/>
+          </a:prstGeom>
+        </p:spPr>
+      </p:pic>
     </p:spTree>
   </p:cSld>
   <p:clrMapOvr>
@@ -3546,14 +4474,21 @@
             <p:ph type="title"/>
           </p:nvPr>
         </p:nvSpPr>
-        <p:spPr/>
-        <p:txBody>
-          <a:bodyPr/>
-          <a:lstStyle/>
-          <a:p>
-            <a:r>
-              <a:t>System Objectives</a:t>
-            </a:r>
+        <p:spPr>
+          <a:xfrm>
+            <a:off x="457199" y="152371"/>
+            <a:ext cx="8229600" cy="1143000"/>
+          </a:xfrm>
+        </p:spPr>
+        <p:txBody>
+          <a:bodyPr/>
+          <a:lstStyle/>
+          <a:p>
+            <a:r>
+              <a:rPr lang="en-US" dirty="0"/>
+              <a:t>Front Website</a:t>
+            </a:r>
+            <a:endParaRPr dirty="0"/>
           </a:p>
         </p:txBody>
       </p:sp>
@@ -3567,32 +4502,58 @@
             <p:ph idx="1"/>
           </p:nvPr>
         </p:nvSpPr>
-        <p:spPr/>
-        <p:txBody>
-          <a:bodyPr/>
-          <a:lstStyle/>
-          <a:p>
-            <a:r>
-              <a:t>In la fududeeyo hospital management</a:t>
-            </a:r>
-          </a:p>
-          <a:p>
-            <a:r>
-              <a:t>In la habeeyo appointments</a:t>
-            </a:r>
-          </a:p>
-          <a:p>
-            <a:r>
-              <a:t>In si secure ah loo kaydiyo patient data</a:t>
-            </a:r>
-          </a:p>
-          <a:p>
-            <a:r>
-              <a:t>In la yareeyo system errors</a:t>
-            </a:r>
-          </a:p>
-        </p:txBody>
-      </p:sp>
+        <p:spPr>
+          <a:xfrm>
+            <a:off x="266700" y="1409671"/>
+            <a:ext cx="8229600" cy="1371600"/>
+          </a:xfrm>
+        </p:spPr>
+        <p:txBody>
+          <a:bodyPr/>
+          <a:lstStyle/>
+          <a:p>
+            <a:r>
+              <a:rPr lang="en-US" dirty="0" err="1"/>
+              <a:t>Fududeeye</a:t>
+            </a:r>
+            <a:r>
+              <a:rPr lang="en-US" dirty="0"/>
+              <a:t> Management System is a system for managing hospitals.</a:t>
+            </a:r>
+            <a:endParaRPr dirty="0"/>
+          </a:p>
+        </p:txBody>
+      </p:sp>
+      <p:pic>
+        <p:nvPicPr>
+          <p:cNvPr id="5" name="Picture 4">
+            <a:extLst>
+              <a:ext uri="{FF2B5EF4-FFF2-40B4-BE49-F238E27FC236}">
+                <a16:creationId xmlns:a16="http://schemas.microsoft.com/office/drawing/2014/main" id="{94149722-C089-66D8-51F9-053DB8DAD8CD}"/>
+              </a:ext>
+            </a:extLst>
+          </p:cNvPr>
+          <p:cNvPicPr>
+            <a:picLocks noChangeAspect="1"/>
+          </p:cNvPicPr>
+          <p:nvPr/>
+        </p:nvPicPr>
+        <p:blipFill>
+          <a:blip r:embed="rId2"/>
+          <a:stretch>
+            <a:fillRect/>
+          </a:stretch>
+        </p:blipFill>
+        <p:spPr>
+          <a:xfrm>
+            <a:off x="647699" y="2781271"/>
+            <a:ext cx="7848601" cy="3667377"/>
+          </a:xfrm>
+          <a:prstGeom prst="rect">
+            <a:avLst/>
+          </a:prstGeom>
+        </p:spPr>
+      </p:pic>
     </p:spTree>
   </p:cSld>
   <p:clrMapOvr>
@@ -3634,47 +4595,43 @@
           <a:lstStyle/>
           <a:p>
             <a:r>
-              <a:t>Technologies Used</a:t>
-            </a:r>
-          </a:p>
-        </p:txBody>
-      </p:sp>
-      <p:sp>
-        <p:nvSpPr>
-          <p:cNvPr id="3" name="Content Placeholder 2"/>
-          <p:cNvSpPr>
-            <a:spLocks noGrp="1"/>
-          </p:cNvSpPr>
-          <p:nvPr>
-            <p:ph idx="1"/>
-          </p:nvPr>
-        </p:nvSpPr>
-        <p:spPr/>
-        <p:txBody>
-          <a:bodyPr/>
-          <a:lstStyle/>
-          <a:p>
-            <a:r>
-              <a:t>Frontend: HTML, CSS, Bootstrap, JavaScript</a:t>
-            </a:r>
-          </a:p>
-          <a:p>
-            <a:r>
-              <a:t>Backend: PHP</a:t>
-            </a:r>
-          </a:p>
-          <a:p>
-            <a:r>
-              <a:t>Database: MySQL</a:t>
-            </a:r>
-          </a:p>
-          <a:p>
-            <a:r>
-              <a:t>Server Environment: XAMPP</a:t>
-            </a:r>
-          </a:p>
-        </p:txBody>
-      </p:sp>
+              <a:rPr lang="en-US" b="1" dirty="0"/>
+              <a:t>OUR KEY FEATURES</a:t>
+            </a:r>
+            <a:endParaRPr b="1" dirty="0"/>
+          </a:p>
+        </p:txBody>
+      </p:sp>
+      <p:pic>
+        <p:nvPicPr>
+          <p:cNvPr id="5" name="Picture 4">
+            <a:extLst>
+              <a:ext uri="{FF2B5EF4-FFF2-40B4-BE49-F238E27FC236}">
+                <a16:creationId xmlns:a16="http://schemas.microsoft.com/office/drawing/2014/main" id="{9AACA234-C796-CCFE-0121-4AF791EC351D}"/>
+              </a:ext>
+            </a:extLst>
+          </p:cNvPr>
+          <p:cNvPicPr>
+            <a:picLocks noChangeAspect="1"/>
+          </p:cNvPicPr>
+          <p:nvPr/>
+        </p:nvPicPr>
+        <p:blipFill>
+          <a:blip r:embed="rId2"/>
+          <a:stretch>
+            <a:fillRect/>
+          </a:stretch>
+        </p:blipFill>
+        <p:spPr>
+          <a:xfrm>
+            <a:off x="165639" y="1523676"/>
+            <a:ext cx="8812721" cy="4104237"/>
+          </a:xfrm>
+          <a:prstGeom prst="rect">
+            <a:avLst/>
+          </a:prstGeom>
+        </p:spPr>
+      </p:pic>
     </p:spTree>
   </p:cSld>
   <p:clrMapOvr>
@@ -3688,7 +4645,13 @@
   <p:cSld>
     <p:spTree>
       <p:nvGrpSpPr>
-        <p:cNvPr id="1" name=""/>
+        <p:cNvPr id="1" name="">
+          <a:extLst>
+            <a:ext uri="{FF2B5EF4-FFF2-40B4-BE49-F238E27FC236}">
+              <a16:creationId xmlns:a16="http://schemas.microsoft.com/office/drawing/2014/main" id="{E37CF9C0-B5BC-9066-FEDC-54A2F5D62873}"/>
+            </a:ext>
+          </a:extLst>
+        </p:cNvPr>
         <p:cNvGrpSpPr/>
         <p:nvPr/>
       </p:nvGrpSpPr>
@@ -3702,7 +4665,13 @@
       </p:grpSpPr>
       <p:sp>
         <p:nvSpPr>
-          <p:cNvPr id="2" name="Title 1"/>
+          <p:cNvPr id="2" name="Title 1">
+            <a:extLst>
+              <a:ext uri="{FF2B5EF4-FFF2-40B4-BE49-F238E27FC236}">
+                <a16:creationId xmlns:a16="http://schemas.microsoft.com/office/drawing/2014/main" id="{B6BA53C6-505C-7648-C92C-A88E801FE829}"/>
+              </a:ext>
+            </a:extLst>
+          </p:cNvPr>
           <p:cNvSpPr>
             <a:spLocks noGrp="1"/>
           </p:cNvSpPr>
@@ -3716,43 +4685,84 @@
           <a:lstStyle/>
           <a:p>
             <a:r>
-              <a:t>System Users (Roles)</a:t>
-            </a:r>
-          </a:p>
-        </p:txBody>
-      </p:sp>
-      <p:sp>
-        <p:nvSpPr>
-          <p:cNvPr id="3" name="Content Placeholder 2"/>
-          <p:cNvSpPr>
-            <a:spLocks noGrp="1"/>
-          </p:cNvSpPr>
-          <p:nvPr>
-            <p:ph idx="1"/>
-          </p:nvPr>
-        </p:nvSpPr>
-        <p:spPr/>
-        <p:txBody>
-          <a:bodyPr/>
-          <a:lstStyle/>
-          <a:p>
-            <a:r>
-              <a:t>Admin – Maamula whole system</a:t>
-            </a:r>
-          </a:p>
-          <a:p>
-            <a:r>
-              <a:t>Doctor – View appointments &amp; patients</a:t>
-            </a:r>
-          </a:p>
-          <a:p>
-            <a:r>
-              <a:t>Patient – Book appointment &amp; view history</a:t>
+              <a:rPr lang="en-US" b="1" dirty="0"/>
+              <a:t>Send us a message </a:t>
+            </a:r>
+            <a:endParaRPr b="1" dirty="0"/>
+          </a:p>
+        </p:txBody>
+      </p:sp>
+      <p:pic>
+        <p:nvPicPr>
+          <p:cNvPr id="4" name="Picture 3">
+            <a:extLst>
+              <a:ext uri="{FF2B5EF4-FFF2-40B4-BE49-F238E27FC236}">
+                <a16:creationId xmlns:a16="http://schemas.microsoft.com/office/drawing/2014/main" id="{F700439F-6030-70BC-3338-14BD2213108F}"/>
+              </a:ext>
+            </a:extLst>
+          </p:cNvPr>
+          <p:cNvPicPr>
+            <a:picLocks noChangeAspect="1"/>
+          </p:cNvPicPr>
+          <p:nvPr/>
+        </p:nvPicPr>
+        <p:blipFill>
+          <a:blip r:embed="rId2"/>
+          <a:stretch>
+            <a:fillRect/>
+          </a:stretch>
+        </p:blipFill>
+        <p:spPr>
+          <a:xfrm>
+            <a:off x="140643" y="2198914"/>
+            <a:ext cx="8862713" cy="4092282"/>
+          </a:xfrm>
+          <a:prstGeom prst="rect">
+            <a:avLst/>
+          </a:prstGeom>
+        </p:spPr>
+      </p:pic>
+      <p:sp>
+        <p:nvSpPr>
+          <p:cNvPr id="7" name="TextBox 6">
+            <a:extLst>
+              <a:ext uri="{FF2B5EF4-FFF2-40B4-BE49-F238E27FC236}">
+                <a16:creationId xmlns:a16="http://schemas.microsoft.com/office/drawing/2014/main" id="{4672E9D1-D8E7-0A74-BEBE-B5F86396A806}"/>
+              </a:ext>
+            </a:extLst>
+          </p:cNvPr>
+          <p:cNvSpPr txBox="1"/>
+          <p:nvPr/>
+        </p:nvSpPr>
+        <p:spPr>
+          <a:xfrm>
+            <a:off x="631370" y="1161944"/>
+            <a:ext cx="7413171" cy="646331"/>
+          </a:xfrm>
+          <a:prstGeom prst="rect">
+            <a:avLst/>
+          </a:prstGeom>
+          <a:noFill/>
+        </p:spPr>
+        <p:txBody>
+          <a:bodyPr wrap="square">
+            <a:spAutoFit/>
+          </a:bodyPr>
+          <a:lstStyle/>
+          <a:p>
+            <a:r>
+              <a:rPr lang="en-US" dirty="0"/>
+              <a:t>The user has the ability to send messages to the admin directly, and the admin can see and react to them.</a:t>
             </a:r>
           </a:p>
         </p:txBody>
       </p:sp>
     </p:spTree>
+    <p:extLst>
+      <p:ext uri="{BB962C8B-B14F-4D97-AF65-F5344CB8AC3E}">
+        <p14:creationId xmlns:p14="http://schemas.microsoft.com/office/powerpoint/2010/main" val="1061218062"/>
+      </p:ext>
+    </p:extLst>
   </p:cSld>
   <p:clrMapOvr>
     <a:masterClrMapping/>
@@ -3765,7 +4775,13 @@
   <p:cSld>
     <p:spTree>
       <p:nvGrpSpPr>
-        <p:cNvPr id="1" name=""/>
+        <p:cNvPr id="1" name="">
+          <a:extLst>
+            <a:ext uri="{FF2B5EF4-FFF2-40B4-BE49-F238E27FC236}">
+              <a16:creationId xmlns:a16="http://schemas.microsoft.com/office/drawing/2014/main" id="{27C01C1D-A540-23F9-768F-7762B2F5CCFF}"/>
+            </a:ext>
+          </a:extLst>
+        </p:cNvPr>
         <p:cNvGrpSpPr/>
         <p:nvPr/>
       </p:nvGrpSpPr>
@@ -3779,7 +4795,13 @@
       </p:grpSpPr>
       <p:sp>
         <p:nvSpPr>
-          <p:cNvPr id="2" name="Title 1"/>
+          <p:cNvPr id="2" name="Title 1">
+            <a:extLst>
+              <a:ext uri="{FF2B5EF4-FFF2-40B4-BE49-F238E27FC236}">
+                <a16:creationId xmlns:a16="http://schemas.microsoft.com/office/drawing/2014/main" id="{0579ECA3-AE2A-9884-B175-7D0F68ABB1B9}"/>
+              </a:ext>
+            </a:extLst>
+          </p:cNvPr>
           <p:cNvSpPr>
             <a:spLocks noGrp="1"/>
           </p:cNvSpPr>
@@ -3787,54 +4809,95 @@
             <p:ph type="title"/>
           </p:nvPr>
         </p:nvSpPr>
-        <p:spPr/>
-        <p:txBody>
-          <a:bodyPr/>
-          <a:lstStyle/>
-          <a:p>
-            <a:r>
-              <a:t>Admin Module</a:t>
-            </a:r>
-          </a:p>
-        </p:txBody>
-      </p:sp>
-      <p:sp>
-        <p:nvSpPr>
-          <p:cNvPr id="3" name="Content Placeholder 2"/>
-          <p:cNvSpPr>
-            <a:spLocks noGrp="1"/>
-          </p:cNvSpPr>
-          <p:nvPr>
-            <p:ph idx="1"/>
-          </p:nvPr>
-        </p:nvSpPr>
-        <p:spPr/>
-        <p:txBody>
-          <a:bodyPr/>
-          <a:lstStyle/>
-          <a:p>
-            <a:r>
-              <a:t>Manage Doctors &amp; Users</a:t>
-            </a:r>
-          </a:p>
-          <a:p>
-            <a:r>
-              <a:t>Manage Appointments</a:t>
-            </a:r>
-          </a:p>
-          <a:p>
-            <a:r>
-              <a:t>View Dashboard &amp; Reports</a:t>
-            </a:r>
-          </a:p>
-          <a:p>
-            <a:r>
-              <a:t>Manage Contact Messages</a:t>
+        <p:spPr>
+          <a:xfrm>
+            <a:off x="337456" y="182566"/>
+            <a:ext cx="7990114" cy="1143000"/>
+          </a:xfrm>
+        </p:spPr>
+        <p:txBody>
+          <a:bodyPr/>
+          <a:lstStyle/>
+          <a:p>
+            <a:r>
+              <a:rPr lang="en-US" b="1" dirty="0"/>
+              <a:t>Footer</a:t>
+            </a:r>
+            <a:endParaRPr b="1" dirty="0"/>
+          </a:p>
+        </p:txBody>
+      </p:sp>
+      <p:pic>
+        <p:nvPicPr>
+          <p:cNvPr id="5" name="Picture 4">
+            <a:extLst>
+              <a:ext uri="{FF2B5EF4-FFF2-40B4-BE49-F238E27FC236}">
+                <a16:creationId xmlns:a16="http://schemas.microsoft.com/office/drawing/2014/main" id="{0679437A-0006-C338-3C82-7C425BAE58AC}"/>
+              </a:ext>
+            </a:extLst>
+          </p:cNvPr>
+          <p:cNvPicPr>
+            <a:picLocks noChangeAspect="1"/>
+          </p:cNvPicPr>
+          <p:nvPr/>
+        </p:nvPicPr>
+        <p:blipFill>
+          <a:blip r:embed="rId2"/>
+          <a:stretch>
+            <a:fillRect/>
+          </a:stretch>
+        </p:blipFill>
+        <p:spPr>
+          <a:xfrm>
+            <a:off x="228600" y="2096867"/>
+            <a:ext cx="8686800" cy="4008939"/>
+          </a:xfrm>
+          <a:prstGeom prst="rect">
+            <a:avLst/>
+          </a:prstGeom>
+        </p:spPr>
+      </p:pic>
+      <p:sp>
+        <p:nvSpPr>
+          <p:cNvPr id="8" name="TextBox 7">
+            <a:extLst>
+              <a:ext uri="{FF2B5EF4-FFF2-40B4-BE49-F238E27FC236}">
+                <a16:creationId xmlns:a16="http://schemas.microsoft.com/office/drawing/2014/main" id="{7969030B-60B1-7018-B479-1AA7C1817718}"/>
+              </a:ext>
+            </a:extLst>
+          </p:cNvPr>
+          <p:cNvSpPr txBox="1"/>
+          <p:nvPr/>
+        </p:nvSpPr>
+        <p:spPr>
+          <a:xfrm>
+            <a:off x="816430" y="1235986"/>
+            <a:ext cx="7228113" cy="646331"/>
+          </a:xfrm>
+          <a:prstGeom prst="rect">
+            <a:avLst/>
+          </a:prstGeom>
+          <a:noFill/>
+        </p:spPr>
+        <p:txBody>
+          <a:bodyPr wrap="square">
+            <a:spAutoFit/>
+          </a:bodyPr>
+          <a:lstStyle/>
+          <a:p>
+            <a:r>
+              <a:rPr lang="en-US" dirty="0"/>
+              <a:t>The footer of the system contains the actual address of the hospital and the hospital's contact information.</a:t>
             </a:r>
           </a:p>
         </p:txBody>
       </p:sp>
     </p:spTree>
+    <p:extLst>
+      <p:ext uri="{BB962C8B-B14F-4D97-AF65-F5344CB8AC3E}">
+        <p14:creationId xmlns:p14="http://schemas.microsoft.com/office/powerpoint/2010/main" val="4256781007"/>
+      </p:ext>
+    </p:extLst>
   </p:cSld>
   <p:clrMapOvr>
     <a:masterClrMapping/>
@@ -3847,7 +4910,13 @@
   <p:cSld>
     <p:spTree>
       <p:nvGrpSpPr>
-        <p:cNvPr id="1" name=""/>
+        <p:cNvPr id="1" name="">
+          <a:extLst>
+            <a:ext uri="{FF2B5EF4-FFF2-40B4-BE49-F238E27FC236}">
+              <a16:creationId xmlns:a16="http://schemas.microsoft.com/office/drawing/2014/main" id="{4269C8BB-D767-6D62-5387-316D6C3F17DE}"/>
+            </a:ext>
+          </a:extLst>
+        </p:cNvPr>
         <p:cNvGrpSpPr/>
         <p:nvPr/>
       </p:nvGrpSpPr>
@@ -3861,28 +4930,13 @@
       </p:grpSpPr>
       <p:sp>
         <p:nvSpPr>
-          <p:cNvPr id="2" name="Title 1"/>
-          <p:cNvSpPr>
-            <a:spLocks noGrp="1"/>
-          </p:cNvSpPr>
-          <p:nvPr>
-            <p:ph type="title"/>
-          </p:nvPr>
-        </p:nvSpPr>
-        <p:spPr/>
-        <p:txBody>
-          <a:bodyPr/>
-          <a:lstStyle/>
-          <a:p>
-            <a:r>
-              <a:t>Doctor Module</a:t>
-            </a:r>
-          </a:p>
-        </p:txBody>
-      </p:sp>
-      <p:sp>
-        <p:nvSpPr>
-          <p:cNvPr id="3" name="Content Placeholder 2"/>
+          <p:cNvPr id="3" name="Content Placeholder 2">
+            <a:extLst>
+              <a:ext uri="{FF2B5EF4-FFF2-40B4-BE49-F238E27FC236}">
+                <a16:creationId xmlns:a16="http://schemas.microsoft.com/office/drawing/2014/main" id="{E7B73456-F4D9-362B-C044-EF0E57199EDA}"/>
+              </a:ext>
+            </a:extLst>
+          </p:cNvPr>
           <p:cNvSpPr>
             <a:spLocks noGrp="1"/>
           </p:cNvSpPr>
@@ -3890,28 +4944,163 @@
             <p:ph idx="1"/>
           </p:nvPr>
         </p:nvSpPr>
-        <p:spPr/>
-        <p:txBody>
-          <a:bodyPr/>
-          <a:lstStyle/>
-          <a:p>
-            <a:r>
-              <a:t>Login &amp; Dashboard access</a:t>
-            </a:r>
-          </a:p>
-          <a:p>
-            <a:r>
-              <a:t>View scheduled appointments</a:t>
-            </a:r>
-          </a:p>
-          <a:p>
-            <a:r>
-              <a:t>Manage profile &amp; password</a:t>
+        <p:spPr>
+          <a:xfrm>
+            <a:off x="457200" y="759507"/>
+            <a:ext cx="8229600" cy="762000"/>
+          </a:xfrm>
+        </p:spPr>
+        <p:txBody>
+          <a:bodyPr/>
+          <a:lstStyle/>
+          <a:p>
+            <a:pPr marL="0" indent="0">
+              <a:buNone/>
+            </a:pPr>
+            <a:r>
+              <a:rPr lang="en-US" b="1" dirty="0"/>
+              <a:t> The system connects Admin, Doctor &amp; Patient.</a:t>
+            </a:r>
+            <a:endParaRPr b="1" dirty="0"/>
+          </a:p>
+        </p:txBody>
+      </p:sp>
+      <p:pic>
+        <p:nvPicPr>
+          <p:cNvPr id="8" name="Picture 7">
+            <a:extLst>
+              <a:ext uri="{FF2B5EF4-FFF2-40B4-BE49-F238E27FC236}">
+                <a16:creationId xmlns:a16="http://schemas.microsoft.com/office/drawing/2014/main" id="{A7C697D0-ACE1-5B10-3C53-BC4351A45DBA}"/>
+              </a:ext>
+            </a:extLst>
+          </p:cNvPr>
+          <p:cNvPicPr>
+            <a:picLocks noChangeAspect="1"/>
+          </p:cNvPicPr>
+          <p:nvPr/>
+        </p:nvPicPr>
+        <p:blipFill>
+          <a:blip r:embed="rId2"/>
+          <a:stretch>
+            <a:fillRect/>
+          </a:stretch>
+        </p:blipFill>
+        <p:spPr>
+          <a:xfrm>
+            <a:off x="5113133" y="1924828"/>
+            <a:ext cx="3993373" cy="3939287"/>
+          </a:xfrm>
+          <a:prstGeom prst="rect">
+            <a:avLst/>
+          </a:prstGeom>
+        </p:spPr>
+      </p:pic>
+      <p:pic>
+        <p:nvPicPr>
+          <p:cNvPr id="9" name="Picture 8">
+            <a:extLst>
+              <a:ext uri="{FF2B5EF4-FFF2-40B4-BE49-F238E27FC236}">
+                <a16:creationId xmlns:a16="http://schemas.microsoft.com/office/drawing/2014/main" id="{EEA328DE-4508-CB69-1907-77097B905DF9}"/>
+              </a:ext>
+            </a:extLst>
+          </p:cNvPr>
+          <p:cNvPicPr>
+            <a:picLocks noChangeAspect="1"/>
+          </p:cNvPicPr>
+          <p:nvPr/>
+        </p:nvPicPr>
+        <p:blipFill>
+          <a:blip r:embed="rId3"/>
+          <a:stretch>
+            <a:fillRect/>
+          </a:stretch>
+        </p:blipFill>
+        <p:spPr>
+          <a:xfrm>
+            <a:off x="37494" y="1924829"/>
+            <a:ext cx="4951850" cy="3939287"/>
+          </a:xfrm>
+          <a:prstGeom prst="rect">
+            <a:avLst/>
+          </a:prstGeom>
+        </p:spPr>
+      </p:pic>
+      <p:sp>
+        <p:nvSpPr>
+          <p:cNvPr id="13" name="TextBox 12">
+            <a:extLst>
+              <a:ext uri="{FF2B5EF4-FFF2-40B4-BE49-F238E27FC236}">
+                <a16:creationId xmlns:a16="http://schemas.microsoft.com/office/drawing/2014/main" id="{B16DF366-381B-0278-069E-32A961CA6A7E}"/>
+              </a:ext>
+            </a:extLst>
+          </p:cNvPr>
+          <p:cNvSpPr txBox="1"/>
+          <p:nvPr/>
+        </p:nvSpPr>
+        <p:spPr>
+          <a:xfrm>
+            <a:off x="1829641" y="1521507"/>
+            <a:ext cx="847674" cy="369332"/>
+          </a:xfrm>
+          <a:prstGeom prst="rect">
+            <a:avLst/>
+          </a:prstGeom>
+          <a:noFill/>
+        </p:spPr>
+        <p:txBody>
+          <a:bodyPr wrap="square">
+            <a:spAutoFit/>
+          </a:bodyPr>
+          <a:lstStyle/>
+          <a:p>
+            <a:r>
+              <a:rPr lang="en-US" b="1" dirty="0"/>
+              <a:t>Login</a:t>
+            </a:r>
+          </a:p>
+        </p:txBody>
+      </p:sp>
+      <p:sp>
+        <p:nvSpPr>
+          <p:cNvPr id="14" name="TextBox 13">
+            <a:extLst>
+              <a:ext uri="{FF2B5EF4-FFF2-40B4-BE49-F238E27FC236}">
+                <a16:creationId xmlns:a16="http://schemas.microsoft.com/office/drawing/2014/main" id="{D8721477-BF5E-B1E1-D0ED-299D9F0E714D}"/>
+              </a:ext>
+            </a:extLst>
+          </p:cNvPr>
+          <p:cNvSpPr txBox="1"/>
+          <p:nvPr/>
+        </p:nvSpPr>
+        <p:spPr>
+          <a:xfrm>
+            <a:off x="5987984" y="1521508"/>
+            <a:ext cx="1783808" cy="369332"/>
+          </a:xfrm>
+          <a:prstGeom prst="rect">
+            <a:avLst/>
+          </a:prstGeom>
+          <a:noFill/>
+        </p:spPr>
+        <p:txBody>
+          <a:bodyPr wrap="square">
+            <a:spAutoFit/>
+          </a:bodyPr>
+          <a:lstStyle/>
+          <a:p>
+            <a:r>
+              <a:rPr lang="en-US" b="1" dirty="0"/>
+              <a:t>Registration</a:t>
             </a:r>
           </a:p>
         </p:txBody>
       </p:sp>
     </p:spTree>
+    <p:extLst>
+      <p:ext uri="{BB962C8B-B14F-4D97-AF65-F5344CB8AC3E}">
+        <p14:creationId xmlns:p14="http://schemas.microsoft.com/office/powerpoint/2010/main" val="1540915698"/>
+      </p:ext>
+    </p:extLst>
   </p:cSld>
   <p:clrMapOvr>
     <a:masterClrMapping/>
@@ -3946,53 +5135,105 @@
             <p:ph type="title"/>
           </p:nvPr>
         </p:nvSpPr>
+        <p:spPr>
+          <a:xfrm>
+            <a:off x="224078" y="309790"/>
+            <a:ext cx="8229600" cy="1143000"/>
+          </a:xfrm>
+        </p:spPr>
+        <p:txBody>
+          <a:bodyPr/>
+          <a:lstStyle/>
+          <a:p>
+            <a:r>
+              <a:rPr b="1" dirty="0">
+                <a:latin typeface="Arial Black" panose="020B0A04020102020204" pitchFamily="34" charset="0"/>
+              </a:rPr>
+              <a:t>Admin Module</a:t>
+            </a:r>
+            <a:r>
+              <a:rPr lang="en-US" b="1" dirty="0">
+                <a:latin typeface="Arial Black" panose="020B0A04020102020204" pitchFamily="34" charset="0"/>
+              </a:rPr>
+              <a:t>s</a:t>
+            </a:r>
+            <a:endParaRPr b="1" dirty="0">
+              <a:latin typeface="Arial Black" panose="020B0A04020102020204" pitchFamily="34" charset="0"/>
+            </a:endParaRPr>
+          </a:p>
+        </p:txBody>
+      </p:sp>
+      <p:sp>
+        <p:nvSpPr>
+          <p:cNvPr id="3" name="Content Placeholder 2"/>
+          <p:cNvSpPr>
+            <a:spLocks noGrp="1"/>
+          </p:cNvSpPr>
+          <p:nvPr>
+            <p:ph idx="1"/>
+          </p:nvPr>
+        </p:nvSpPr>
         <p:spPr/>
         <p:txBody>
           <a:bodyPr/>
           <a:lstStyle/>
           <a:p>
-            <a:r>
-              <a:t>Patient Module</a:t>
-            </a:r>
-          </a:p>
-        </p:txBody>
-      </p:sp>
-      <p:sp>
-        <p:nvSpPr>
-          <p:cNvPr id="3" name="Content Placeholder 2"/>
-          <p:cNvSpPr>
-            <a:spLocks noGrp="1"/>
-          </p:cNvSpPr>
-          <p:nvPr>
-            <p:ph idx="1"/>
-          </p:nvPr>
-        </p:nvSpPr>
-        <p:spPr/>
-        <p:txBody>
-          <a:bodyPr/>
-          <a:lstStyle/>
-          <a:p>
-            <a:r>
-              <a:t>Registration &amp; Login</a:t>
-            </a:r>
-          </a:p>
-          <a:p>
-            <a:r>
-              <a:t>Book appointment online</a:t>
-            </a:r>
-          </a:p>
-          <a:p>
-            <a:r>
-              <a:t>View appointment history</a:t>
-            </a:r>
-          </a:p>
-          <a:p>
-            <a:r>
-              <a:t>Update profile &amp; password</a:t>
-            </a:r>
-          </a:p>
-        </p:txBody>
-      </p:sp>
+            <a:pPr marL="0" indent="0">
+              <a:buNone/>
+            </a:pPr>
+            <a:r>
+              <a:rPr lang="en-US" dirty="0"/>
+              <a:t>Admin </a:t>
+            </a:r>
+            <a:r>
+              <a:rPr dirty="0"/>
+              <a:t>Dashboard</a:t>
+            </a:r>
+            <a:endParaRPr lang="en-US" dirty="0"/>
+          </a:p>
+          <a:p>
+            <a:pPr>
+              <a:buFont typeface="Wingdings" panose="05000000000000000000" pitchFamily="2" charset="2"/>
+              <a:buChar char="q"/>
+            </a:pPr>
+            <a:r>
+              <a:rPr lang="en-US" sz="1800" dirty="0"/>
+              <a:t>This is the admin dashboard which consists of various advanced sections.</a:t>
+            </a:r>
+            <a:endParaRPr sz="1800" dirty="0"/>
+          </a:p>
+        </p:txBody>
+      </p:sp>
+      <p:pic>
+        <p:nvPicPr>
+          <p:cNvPr id="5" name="Picture 4">
+            <a:extLst>
+              <a:ext uri="{FF2B5EF4-FFF2-40B4-BE49-F238E27FC236}">
+                <a16:creationId xmlns:a16="http://schemas.microsoft.com/office/drawing/2014/main" id="{538689B3-8244-6230-48AB-9165AE57B6B5}"/>
+              </a:ext>
+            </a:extLst>
+          </p:cNvPr>
+          <p:cNvPicPr>
+            <a:picLocks noChangeAspect="1"/>
+          </p:cNvPicPr>
+          <p:nvPr/>
+        </p:nvPicPr>
+        <p:blipFill>
+          <a:blip r:embed="rId2"/>
+          <a:stretch>
+            <a:fillRect/>
+          </a:stretch>
+        </p:blipFill>
+        <p:spPr>
+          <a:xfrm>
+            <a:off x="457200" y="2739458"/>
+            <a:ext cx="7981071" cy="3689010"/>
+          </a:xfrm>
+          <a:prstGeom prst="rect">
+            <a:avLst/>
+          </a:prstGeom>
+        </p:spPr>
+      </p:pic>
     </p:spTree>
   </p:cSld>
   <p:clrMapOvr>
@@ -4006,7 +5247,13 @@
   <p:cSld>
     <p:spTree>
       <p:nvGrpSpPr>
-        <p:cNvPr id="1" name=""/>
+        <p:cNvPr id="1" name="">
+          <a:extLst>
+            <a:ext uri="{FF2B5EF4-FFF2-40B4-BE49-F238E27FC236}">
+              <a16:creationId xmlns:a16="http://schemas.microsoft.com/office/drawing/2014/main" id="{3EA0683C-2933-291F-FB63-3F6E1805B44F}"/>
+            </a:ext>
+          </a:extLst>
+        </p:cNvPr>
         <p:cNvGrpSpPr/>
         <p:nvPr/>
       </p:nvGrpSpPr>
@@ -4020,7 +5267,13 @@
       </p:grpSpPr>
       <p:sp>
         <p:nvSpPr>
-          <p:cNvPr id="2" name="Title 1"/>
+          <p:cNvPr id="2" name="Title 1">
+            <a:extLst>
+              <a:ext uri="{FF2B5EF4-FFF2-40B4-BE49-F238E27FC236}">
+                <a16:creationId xmlns:a16="http://schemas.microsoft.com/office/drawing/2014/main" id="{DC9EDF55-20B0-A32A-9897-5A960678F284}"/>
+              </a:ext>
+            </a:extLst>
+          </p:cNvPr>
           <p:cNvSpPr>
             <a:spLocks noGrp="1"/>
           </p:cNvSpPr>
@@ -4034,14 +5287,26 @@
           <a:lstStyle/>
           <a:p>
             <a:r>
-              <a:t>System Workflow</a:t>
-            </a:r>
-          </a:p>
-        </p:txBody>
-      </p:sp>
-      <p:sp>
-        <p:nvSpPr>
-          <p:cNvPr id="3" name="Content Placeholder 2"/>
+              <a:rPr b="1" dirty="0"/>
+              <a:t>Admin Module</a:t>
+            </a:r>
+            <a:r>
+              <a:rPr lang="en-US" b="1" dirty="0"/>
+              <a:t>s</a:t>
+            </a:r>
+            <a:endParaRPr b="1" dirty="0"/>
+          </a:p>
+        </p:txBody>
+      </p:sp>
+      <p:sp>
+        <p:nvSpPr>
+          <p:cNvPr id="3" name="Content Placeholder 2">
+            <a:extLst>
+              <a:ext uri="{FF2B5EF4-FFF2-40B4-BE49-F238E27FC236}">
+                <a16:creationId xmlns:a16="http://schemas.microsoft.com/office/drawing/2014/main" id="{E94509A9-0267-3040-339C-E5BAFDB677CF}"/>
+              </a:ext>
+            </a:extLst>
+          </p:cNvPr>
           <p:cNvSpPr>
             <a:spLocks noGrp="1"/>
           </p:cNvSpPr>
@@ -4049,28 +5314,176 @@
             <p:ph idx="1"/>
           </p:nvPr>
         </p:nvSpPr>
-        <p:spPr/>
-        <p:txBody>
-          <a:bodyPr/>
-          <a:lstStyle/>
-          <a:p>
-            <a:r>
-              <a:t>Patient → Register/Login → Book appointment</a:t>
-            </a:r>
-          </a:p>
-          <a:p>
-            <a:r>
-              <a:t>Doctor → Login → View appointments</a:t>
-            </a:r>
-          </a:p>
-          <a:p>
-            <a:r>
-              <a:t>Admin → Monitor &amp; manage whole system</a:t>
+        <p:spPr>
+          <a:xfrm>
+            <a:off x="437538" y="1326063"/>
+            <a:ext cx="8229600" cy="4525963"/>
+          </a:xfrm>
+        </p:spPr>
+        <p:txBody>
+          <a:bodyPr>
+            <a:normAutofit/>
+          </a:bodyPr>
+          <a:lstStyle/>
+          <a:p>
+            <a:pPr marL="0" indent="0">
+              <a:buNone/>
+            </a:pPr>
+            <a:r>
+              <a:rPr sz="2000" b="1" dirty="0"/>
+              <a:t>Manage Doctors &amp; Users</a:t>
+            </a:r>
+            <a:endParaRPr lang="en-US" sz="2000" b="1" dirty="0"/>
+          </a:p>
+          <a:p>
+            <a:pPr>
+              <a:buFont typeface="Wingdings" panose="05000000000000000000" pitchFamily="2" charset="2"/>
+              <a:buChar char="q"/>
+            </a:pPr>
+            <a:r>
+              <a:rPr lang="en-US" sz="1600" dirty="0"/>
+              <a:t>This is the Manage Doctors and Manage Users sections, the Admin has the ability to manage both of these.</a:t>
+            </a:r>
+            <a:endParaRPr sz="1600" dirty="0"/>
+          </a:p>
+        </p:txBody>
+      </p:sp>
+      <p:pic>
+        <p:nvPicPr>
+          <p:cNvPr id="6" name="Picture 5">
+            <a:extLst>
+              <a:ext uri="{FF2B5EF4-FFF2-40B4-BE49-F238E27FC236}">
+                <a16:creationId xmlns:a16="http://schemas.microsoft.com/office/drawing/2014/main" id="{42607B16-8234-69D1-8B17-90CD1BAB3FCB}"/>
+              </a:ext>
+            </a:extLst>
+          </p:cNvPr>
+          <p:cNvPicPr>
+            <a:picLocks noChangeAspect="1"/>
+          </p:cNvPicPr>
+          <p:nvPr/>
+        </p:nvPicPr>
+        <p:blipFill>
+          <a:blip r:embed="rId2"/>
+          <a:stretch>
+            <a:fillRect/>
+          </a:stretch>
+        </p:blipFill>
+        <p:spPr>
+          <a:xfrm>
+            <a:off x="4679703" y="3567169"/>
+            <a:ext cx="4364219" cy="2049860"/>
+          </a:xfrm>
+          <a:prstGeom prst="rect">
+            <a:avLst/>
+          </a:prstGeom>
+        </p:spPr>
+      </p:pic>
+      <p:pic>
+        <p:nvPicPr>
+          <p:cNvPr id="8" name="Picture 7">
+            <a:extLst>
+              <a:ext uri="{FF2B5EF4-FFF2-40B4-BE49-F238E27FC236}">
+                <a16:creationId xmlns:a16="http://schemas.microsoft.com/office/drawing/2014/main" id="{C9E4E48E-97A0-1716-0B35-77424EB1D454}"/>
+              </a:ext>
+            </a:extLst>
+          </p:cNvPr>
+          <p:cNvPicPr>
+            <a:picLocks noChangeAspect="1"/>
+          </p:cNvPicPr>
+          <p:nvPr/>
+        </p:nvPicPr>
+        <p:blipFill>
+          <a:blip r:embed="rId3"/>
+          <a:stretch>
+            <a:fillRect/>
+          </a:stretch>
+        </p:blipFill>
+        <p:spPr>
+          <a:xfrm>
+            <a:off x="140525" y="3569540"/>
+            <a:ext cx="4431475" cy="2071889"/>
+          </a:xfrm>
+          <a:prstGeom prst="rect">
+            <a:avLst/>
+          </a:prstGeom>
+        </p:spPr>
+      </p:pic>
+      <p:sp>
+        <p:nvSpPr>
+          <p:cNvPr id="10" name="TextBox 9">
+            <a:extLst>
+              <a:ext uri="{FF2B5EF4-FFF2-40B4-BE49-F238E27FC236}">
+                <a16:creationId xmlns:a16="http://schemas.microsoft.com/office/drawing/2014/main" id="{4E23C047-7AF3-1CC2-CDD8-E0FFF4EDDC30}"/>
+              </a:ext>
+            </a:extLst>
+          </p:cNvPr>
+          <p:cNvSpPr txBox="1"/>
+          <p:nvPr/>
+        </p:nvSpPr>
+        <p:spPr>
+          <a:xfrm>
+            <a:off x="457200" y="2892255"/>
+            <a:ext cx="2090057" cy="400110"/>
+          </a:xfrm>
+          <a:prstGeom prst="rect">
+            <a:avLst/>
+          </a:prstGeom>
+          <a:noFill/>
+        </p:spPr>
+        <p:txBody>
+          <a:bodyPr wrap="square">
+            <a:spAutoFit/>
+          </a:bodyPr>
+          <a:lstStyle/>
+          <a:p>
+            <a:r>
+              <a:rPr lang="en-US" sz="2000" b="1" dirty="0"/>
+              <a:t>Manage Doctors </a:t>
+            </a:r>
+          </a:p>
+        </p:txBody>
+      </p:sp>
+      <p:sp>
+        <p:nvSpPr>
+          <p:cNvPr id="11" name="TextBox 10">
+            <a:extLst>
+              <a:ext uri="{FF2B5EF4-FFF2-40B4-BE49-F238E27FC236}">
+                <a16:creationId xmlns:a16="http://schemas.microsoft.com/office/drawing/2014/main" id="{33A9C69B-DB4B-06E8-AD79-4EA842088B35}"/>
+              </a:ext>
+            </a:extLst>
+          </p:cNvPr>
+          <p:cNvSpPr txBox="1"/>
+          <p:nvPr/>
+        </p:nvSpPr>
+        <p:spPr>
+          <a:xfrm>
+            <a:off x="5551716" y="2844600"/>
+            <a:ext cx="2090057" cy="400110"/>
+          </a:xfrm>
+          <a:prstGeom prst="rect">
+            <a:avLst/>
+          </a:prstGeom>
+          <a:noFill/>
+        </p:spPr>
+        <p:txBody>
+          <a:bodyPr wrap="square">
+            <a:spAutoFit/>
+          </a:bodyPr>
+          <a:lstStyle/>
+          <a:p>
+            <a:r>
+              <a:rPr lang="en-US" sz="2000" b="1" dirty="0"/>
+              <a:t>Manage Users </a:t>
             </a:r>
           </a:p>
         </p:txBody>
       </p:sp>
     </p:spTree>
+    <p:extLst>
+      <p:ext uri="{BB962C8B-B14F-4D97-AF65-F5344CB8AC3E}">
+        <p14:creationId xmlns:p14="http://schemas.microsoft.com/office/powerpoint/2010/main" val="2527647744"/>
+      </p:ext>
+    </p:extLst>
   </p:cSld>
   <p:clrMapOvr>
     <a:masterClrMapping/>

</xml_diff>